<commit_message>
adds preliminary macOS CryptoTokenKit documentation
</commit_message>
<xml_diff>
--- a/src/CryptoProvidersSigningFlow.pptx
+++ b/src/CryptoProvidersSigningFlow.pptx
@@ -104,6 +104,11 @@
       </a:defRPr>
     </a:lvl9pPr>
   </p:defaultTextStyle>
+  <p:extLst>
+    <p:ext uri="{EFAFB233-063F-42B5-8137-9DF3F51BA10A}">
+      <p15:sldGuideLst xmlns:p15="http://schemas.microsoft.com/office/powerpoint/2012/main"/>
+    </p:ext>
+  </p:extLst>
 </p:presentation>
 </file>
 
@@ -238,7 +243,7 @@
           <a:p>
             <a:fld id="{98DAC7ED-0124-4475-AB10-3A7CB843D580}" type="datetimeFigureOut">
               <a:rPr lang="de-AT" smtClean="0"/>
-              <a:t>28.11.2021</a:t>
+              <a:t>06.03.2024</a:t>
             </a:fld>
             <a:endParaRPr lang="de-AT"/>
           </a:p>
@@ -408,7 +413,7 @@
           <a:p>
             <a:fld id="{98DAC7ED-0124-4475-AB10-3A7CB843D580}" type="datetimeFigureOut">
               <a:rPr lang="de-AT" smtClean="0"/>
-              <a:t>28.11.2021</a:t>
+              <a:t>06.03.2024</a:t>
             </a:fld>
             <a:endParaRPr lang="de-AT"/>
           </a:p>
@@ -588,7 +593,7 @@
           <a:p>
             <a:fld id="{98DAC7ED-0124-4475-AB10-3A7CB843D580}" type="datetimeFigureOut">
               <a:rPr lang="de-AT" smtClean="0"/>
-              <a:t>28.11.2021</a:t>
+              <a:t>06.03.2024</a:t>
             </a:fld>
             <a:endParaRPr lang="de-AT"/>
           </a:p>
@@ -758,7 +763,7 @@
           <a:p>
             <a:fld id="{98DAC7ED-0124-4475-AB10-3A7CB843D580}" type="datetimeFigureOut">
               <a:rPr lang="de-AT" smtClean="0"/>
-              <a:t>28.11.2021</a:t>
+              <a:t>06.03.2024</a:t>
             </a:fld>
             <a:endParaRPr lang="de-AT"/>
           </a:p>
@@ -1004,7 +1009,7 @@
           <a:p>
             <a:fld id="{98DAC7ED-0124-4475-AB10-3A7CB843D580}" type="datetimeFigureOut">
               <a:rPr lang="de-AT" smtClean="0"/>
-              <a:t>28.11.2021</a:t>
+              <a:t>06.03.2024</a:t>
             </a:fld>
             <a:endParaRPr lang="de-AT"/>
           </a:p>
@@ -1236,7 +1241,7 @@
           <a:p>
             <a:fld id="{98DAC7ED-0124-4475-AB10-3A7CB843D580}" type="datetimeFigureOut">
               <a:rPr lang="de-AT" smtClean="0"/>
-              <a:t>28.11.2021</a:t>
+              <a:t>06.03.2024</a:t>
             </a:fld>
             <a:endParaRPr lang="de-AT"/>
           </a:p>
@@ -1603,7 +1608,7 @@
           <a:p>
             <a:fld id="{98DAC7ED-0124-4475-AB10-3A7CB843D580}" type="datetimeFigureOut">
               <a:rPr lang="de-AT" smtClean="0"/>
-              <a:t>28.11.2021</a:t>
+              <a:t>06.03.2024</a:t>
             </a:fld>
             <a:endParaRPr lang="de-AT"/>
           </a:p>
@@ -1721,7 +1726,7 @@
           <a:p>
             <a:fld id="{98DAC7ED-0124-4475-AB10-3A7CB843D580}" type="datetimeFigureOut">
               <a:rPr lang="de-AT" smtClean="0"/>
-              <a:t>28.11.2021</a:t>
+              <a:t>06.03.2024</a:t>
             </a:fld>
             <a:endParaRPr lang="de-AT"/>
           </a:p>
@@ -1816,7 +1821,7 @@
           <a:p>
             <a:fld id="{98DAC7ED-0124-4475-AB10-3A7CB843D580}" type="datetimeFigureOut">
               <a:rPr lang="de-AT" smtClean="0"/>
-              <a:t>28.11.2021</a:t>
+              <a:t>06.03.2024</a:t>
             </a:fld>
             <a:endParaRPr lang="de-AT"/>
           </a:p>
@@ -2093,7 +2098,7 @@
           <a:p>
             <a:fld id="{98DAC7ED-0124-4475-AB10-3A7CB843D580}" type="datetimeFigureOut">
               <a:rPr lang="de-AT" smtClean="0"/>
-              <a:t>28.11.2021</a:t>
+              <a:t>06.03.2024</a:t>
             </a:fld>
             <a:endParaRPr lang="de-AT"/>
           </a:p>
@@ -2350,7 +2355,7 @@
           <a:p>
             <a:fld id="{98DAC7ED-0124-4475-AB10-3A7CB843D580}" type="datetimeFigureOut">
               <a:rPr lang="de-AT" smtClean="0"/>
-              <a:t>28.11.2021</a:t>
+              <a:t>06.03.2024</a:t>
             </a:fld>
             <a:endParaRPr lang="de-AT"/>
           </a:p>
@@ -2563,7 +2568,7 @@
           <a:p>
             <a:fld id="{98DAC7ED-0124-4475-AB10-3A7CB843D580}" type="datetimeFigureOut">
               <a:rPr lang="de-AT" smtClean="0"/>
-              <a:t>28.11.2021</a:t>
+              <a:t>06.03.2024</a:t>
             </a:fld>
             <a:endParaRPr lang="de-AT"/>
           </a:p>
@@ -2968,1315 +2973,1481 @@
           <a:chExt cx="0" cy="0"/>
         </a:xfrm>
       </p:grpSpPr>
-      <p:sp>
-        <p:nvSpPr>
-          <p:cNvPr id="85" name="TextBox 84">
+      <p:grpSp>
+        <p:nvGrpSpPr>
+          <p:cNvPr id="2" name="Group 1">
             <a:extLst>
               <a:ext uri="{FF2B5EF4-FFF2-40B4-BE49-F238E27FC236}">
-                <a16:creationId xmlns:a16="http://schemas.microsoft.com/office/drawing/2014/main" id="{A08EE27B-0ED6-4BFE-8C6E-0B807E71486C}"/>
+                <a16:creationId xmlns:a16="http://schemas.microsoft.com/office/drawing/2014/main" id="{9ADD9CC6-1F67-47D0-B939-9176047B44FB}"/>
               </a:ext>
             </a:extLst>
           </p:cNvPr>
-          <p:cNvSpPr txBox="1"/>
+          <p:cNvGrpSpPr/>
           <p:nvPr/>
-        </p:nvSpPr>
-        <p:spPr>
+        </p:nvGrpSpPr>
+        <p:grpSpPr>
           <a:xfrm>
-            <a:off x="213056" y="227733"/>
-            <a:ext cx="7242967" cy="3864122"/>
+            <a:off x="213056" y="227732"/>
+            <a:ext cx="11688886" cy="4024672"/>
+            <a:chOff x="213056" y="227732"/>
+            <a:chExt cx="11688886" cy="4024672"/>
           </a:xfrm>
-          <a:prstGeom prst="rect">
-            <a:avLst/>
-          </a:prstGeom>
-          <a:solidFill>
-            <a:schemeClr val="bg1">
-              <a:lumMod val="95000"/>
-            </a:schemeClr>
-          </a:solidFill>
-          <a:ln>
+        </p:grpSpPr>
+        <p:sp>
+          <p:nvSpPr>
+            <p:cNvPr id="85" name="TextBox 84">
+              <a:extLst>
+                <a:ext uri="{FF2B5EF4-FFF2-40B4-BE49-F238E27FC236}">
+                  <a16:creationId xmlns:a16="http://schemas.microsoft.com/office/drawing/2014/main" id="{A08EE27B-0ED6-4BFE-8C6E-0B807E71486C}"/>
+                </a:ext>
+              </a:extLst>
+            </p:cNvPr>
+            <p:cNvSpPr txBox="1"/>
+            <p:nvPr/>
+          </p:nvSpPr>
+          <p:spPr>
+            <a:xfrm>
+              <a:off x="213056" y="227732"/>
+              <a:ext cx="7242967" cy="4024672"/>
+            </a:xfrm>
+            <a:prstGeom prst="rect">
+              <a:avLst/>
+            </a:prstGeom>
             <a:solidFill>
+              <a:schemeClr val="bg1">
+                <a:lumMod val="95000"/>
+              </a:schemeClr>
+            </a:solidFill>
+            <a:ln>
+              <a:solidFill>
+                <a:schemeClr val="tx1"/>
+              </a:solidFill>
+            </a:ln>
+          </p:spPr>
+          <p:txBody>
+            <a:bodyPr wrap="square" rtlCol="0">
+              <a:noAutofit/>
+            </a:bodyPr>
+            <a:lstStyle/>
+            <a:p>
+              <a:r>
+                <a:rPr lang="en-US" b="1" dirty="0"/>
+                <a:t>Build Node or PC</a:t>
+              </a:r>
+            </a:p>
+          </p:txBody>
+        </p:sp>
+        <p:sp>
+          <p:nvSpPr>
+            <p:cNvPr id="86" name="TextBox 85">
+              <a:extLst>
+                <a:ext uri="{FF2B5EF4-FFF2-40B4-BE49-F238E27FC236}">
+                  <a16:creationId xmlns:a16="http://schemas.microsoft.com/office/drawing/2014/main" id="{ABA3453E-A4C6-4F56-9212-606CBA299D0A}"/>
+                </a:ext>
+              </a:extLst>
+            </p:cNvPr>
+            <p:cNvSpPr txBox="1"/>
+            <p:nvPr/>
+          </p:nvSpPr>
+          <p:spPr>
+            <a:xfrm>
+              <a:off x="500514" y="834231"/>
+              <a:ext cx="1834176" cy="3257618"/>
+            </a:xfrm>
+            <a:prstGeom prst="rect">
+              <a:avLst/>
+            </a:prstGeom>
+            <a:solidFill>
+              <a:srgbClr val="FFC000"/>
+            </a:solidFill>
+            <a:ln>
+              <a:solidFill>
+                <a:schemeClr val="tx1"/>
+              </a:solidFill>
+            </a:ln>
+          </p:spPr>
+          <p:txBody>
+            <a:bodyPr wrap="square" rtlCol="0">
+              <a:noAutofit/>
+            </a:bodyPr>
+            <a:lstStyle/>
+            <a:p>
+              <a:pPr algn="ctr"/>
+              <a:r>
+                <a:rPr lang="en-US"/>
+                <a:t>Signing Tool</a:t>
+              </a:r>
+            </a:p>
+          </p:txBody>
+        </p:sp>
+        <p:sp>
+          <p:nvSpPr>
+            <p:cNvPr id="87" name="TextBox 86">
+              <a:extLst>
+                <a:ext uri="{FF2B5EF4-FFF2-40B4-BE49-F238E27FC236}">
+                  <a16:creationId xmlns:a16="http://schemas.microsoft.com/office/drawing/2014/main" id="{72335272-C8F1-43BC-AD04-306BA0FFE9CF}"/>
+                </a:ext>
+              </a:extLst>
+            </p:cNvPr>
+            <p:cNvSpPr txBox="1"/>
+            <p:nvPr/>
+          </p:nvSpPr>
+          <p:spPr>
+            <a:xfrm>
+              <a:off x="2644253" y="834230"/>
+              <a:ext cx="1764730" cy="3257621"/>
+            </a:xfrm>
+            <a:prstGeom prst="rect">
+              <a:avLst/>
+            </a:prstGeom>
+            <a:solidFill>
+              <a:srgbClr val="FFC000"/>
+            </a:solidFill>
+            <a:ln>
+              <a:solidFill>
+                <a:schemeClr val="tx1"/>
+              </a:solidFill>
+            </a:ln>
+          </p:spPr>
+          <p:txBody>
+            <a:bodyPr wrap="square" rtlCol="0">
+              <a:noAutofit/>
+            </a:bodyPr>
+            <a:lstStyle/>
+            <a:p>
+              <a:pPr algn="ctr"/>
+              <a:r>
+                <a:rPr lang="en-US"/>
+                <a:t>API or Engine</a:t>
+              </a:r>
+            </a:p>
+          </p:txBody>
+        </p:sp>
+        <p:sp>
+          <p:nvSpPr>
+            <p:cNvPr id="88" name="TextBox 87">
+              <a:extLst>
+                <a:ext uri="{FF2B5EF4-FFF2-40B4-BE49-F238E27FC236}">
+                  <a16:creationId xmlns:a16="http://schemas.microsoft.com/office/drawing/2014/main" id="{02A548F8-4E1F-4A4C-82EA-045C2335CCD9}"/>
+                </a:ext>
+              </a:extLst>
+            </p:cNvPr>
+            <p:cNvSpPr txBox="1"/>
+            <p:nvPr/>
+          </p:nvSpPr>
+          <p:spPr>
+            <a:xfrm>
+              <a:off x="4721647" y="834231"/>
+              <a:ext cx="2415886" cy="3257618"/>
+            </a:xfrm>
+            <a:prstGeom prst="rect">
+              <a:avLst/>
+            </a:prstGeom>
+            <a:solidFill>
+              <a:srgbClr val="FFC000"/>
+            </a:solidFill>
+            <a:ln>
+              <a:solidFill>
+                <a:schemeClr val="tx1"/>
+              </a:solidFill>
+            </a:ln>
+          </p:spPr>
+          <p:txBody>
+            <a:bodyPr wrap="square" rtlCol="0">
+              <a:noAutofit/>
+            </a:bodyPr>
+            <a:lstStyle/>
+            <a:p>
+              <a:pPr algn="ctr"/>
+              <a:r>
+                <a:rPr lang="en-US"/>
+                <a:t>Crypto Provider</a:t>
+              </a:r>
+            </a:p>
+          </p:txBody>
+        </p:sp>
+        <p:sp>
+          <p:nvSpPr>
+            <p:cNvPr id="89" name="TextBox 88">
+              <a:extLst>
+                <a:ext uri="{FF2B5EF4-FFF2-40B4-BE49-F238E27FC236}">
+                  <a16:creationId xmlns:a16="http://schemas.microsoft.com/office/drawing/2014/main" id="{08788219-EB4D-409E-B07C-5730BB942A1F}"/>
+                </a:ext>
+              </a:extLst>
+            </p:cNvPr>
+            <p:cNvSpPr txBox="1"/>
+            <p:nvPr/>
+          </p:nvSpPr>
+          <p:spPr>
+            <a:xfrm>
+              <a:off x="8155743" y="834231"/>
+              <a:ext cx="2180426" cy="2912899"/>
+            </a:xfrm>
+            <a:prstGeom prst="rect">
+              <a:avLst/>
+            </a:prstGeom>
+            <a:solidFill>
+              <a:srgbClr val="00B0F0"/>
+            </a:solidFill>
+            <a:ln>
+              <a:solidFill>
+                <a:schemeClr val="tx1"/>
+              </a:solidFill>
+            </a:ln>
+          </p:spPr>
+          <p:txBody>
+            <a:bodyPr wrap="square" rtlCol="0" anchor="t" anchorCtr="0">
+              <a:noAutofit/>
+            </a:bodyPr>
+            <a:lstStyle/>
+            <a:p>
+              <a:pPr algn="ctr"/>
+              <a:r>
+                <a:rPr lang="en-US" b="1">
+                  <a:solidFill>
+                    <a:schemeClr val="bg1"/>
+                  </a:solidFill>
+                </a:rPr>
+                <a:t>SignPath</a:t>
+              </a:r>
+            </a:p>
+          </p:txBody>
+        </p:sp>
+        <p:sp>
+          <p:nvSpPr>
+            <p:cNvPr id="90" name="TextBox 89">
+              <a:extLst>
+                <a:ext uri="{FF2B5EF4-FFF2-40B4-BE49-F238E27FC236}">
+                  <a16:creationId xmlns:a16="http://schemas.microsoft.com/office/drawing/2014/main" id="{34919C27-DFA0-4D8A-A601-A59528F5E4B6}"/>
+                </a:ext>
+              </a:extLst>
+            </p:cNvPr>
+            <p:cNvSpPr txBox="1"/>
+            <p:nvPr/>
+          </p:nvSpPr>
+          <p:spPr>
+            <a:xfrm>
+              <a:off x="10732169" y="834231"/>
+              <a:ext cx="1169773" cy="2912899"/>
+            </a:xfrm>
+            <a:prstGeom prst="rect">
+              <a:avLst/>
+            </a:prstGeom>
+            <a:solidFill>
+              <a:srgbClr val="FFC000"/>
+            </a:solidFill>
+            <a:ln>
+              <a:solidFill>
+                <a:schemeClr val="tx1"/>
+              </a:solidFill>
+            </a:ln>
+          </p:spPr>
+          <p:txBody>
+            <a:bodyPr wrap="square" rtlCol="0" anchor="t" anchorCtr="0">
+              <a:noAutofit/>
+            </a:bodyPr>
+            <a:lstStyle>
+              <a:defPPr>
+                <a:defRPr lang="de-DE"/>
+              </a:defPPr>
+            </a:lstStyle>
+            <a:p>
+              <a:pPr algn="ctr"/>
+              <a:r>
+                <a:rPr lang="en-US" b="1"/>
+                <a:t>HSM</a:t>
+              </a:r>
+            </a:p>
+          </p:txBody>
+        </p:sp>
+        <p:cxnSp>
+          <p:nvCxnSpPr>
+            <p:cNvPr id="91" name="Straight Arrow Connector 90">
+              <a:extLst>
+                <a:ext uri="{FF2B5EF4-FFF2-40B4-BE49-F238E27FC236}">
+                  <a16:creationId xmlns:a16="http://schemas.microsoft.com/office/drawing/2014/main" id="{463C70AE-6F58-4FAC-9346-8DC6FEF4A6FB}"/>
+                </a:ext>
+              </a:extLst>
+            </p:cNvPr>
+            <p:cNvCxnSpPr/>
+            <p:nvPr/>
+          </p:nvCxnSpPr>
+          <p:spPr>
+            <a:xfrm>
+              <a:off x="2334690" y="1636353"/>
+              <a:ext cx="309563" cy="0"/>
+            </a:xfrm>
+            <a:prstGeom prst="straightConnector1">
+              <a:avLst/>
+            </a:prstGeom>
+            <a:ln>
+              <a:solidFill>
+                <a:schemeClr val="tx1"/>
+              </a:solidFill>
+              <a:tailEnd type="triangle" w="lg" len="lg"/>
+            </a:ln>
+          </p:spPr>
+          <p:style>
+            <a:lnRef idx="1">
+              <a:schemeClr val="accent1"/>
+            </a:lnRef>
+            <a:fillRef idx="0">
+              <a:schemeClr val="accent1"/>
+            </a:fillRef>
+            <a:effectRef idx="0">
+              <a:schemeClr val="accent1"/>
+            </a:effectRef>
+            <a:fontRef idx="minor">
               <a:schemeClr val="tx1"/>
+            </a:fontRef>
+          </p:style>
+        </p:cxnSp>
+        <p:cxnSp>
+          <p:nvCxnSpPr>
+            <p:cNvPr id="92" name="Straight Arrow Connector 91">
+              <a:extLst>
+                <a:ext uri="{FF2B5EF4-FFF2-40B4-BE49-F238E27FC236}">
+                  <a16:creationId xmlns:a16="http://schemas.microsoft.com/office/drawing/2014/main" id="{F6115A48-4EA1-4DF8-B139-75B85F693C80}"/>
+                </a:ext>
+              </a:extLst>
+            </p:cNvPr>
+            <p:cNvCxnSpPr/>
+            <p:nvPr/>
+          </p:nvCxnSpPr>
+          <p:spPr>
+            <a:xfrm>
+              <a:off x="4412084" y="1636353"/>
+              <a:ext cx="309563" cy="0"/>
+            </a:xfrm>
+            <a:prstGeom prst="straightConnector1">
+              <a:avLst/>
+            </a:prstGeom>
+            <a:ln>
+              <a:solidFill>
+                <a:schemeClr val="tx1"/>
+              </a:solidFill>
+              <a:tailEnd type="triangle" w="lg" len="lg"/>
+            </a:ln>
+          </p:spPr>
+          <p:style>
+            <a:lnRef idx="1">
+              <a:schemeClr val="accent1"/>
+            </a:lnRef>
+            <a:fillRef idx="0">
+              <a:schemeClr val="accent1"/>
+            </a:fillRef>
+            <a:effectRef idx="0">
+              <a:schemeClr val="accent1"/>
+            </a:effectRef>
+            <a:fontRef idx="minor">
+              <a:schemeClr val="tx1"/>
+            </a:fontRef>
+          </p:style>
+        </p:cxnSp>
+        <p:cxnSp>
+          <p:nvCxnSpPr>
+            <p:cNvPr id="93" name="Straight Arrow Connector 92">
+              <a:extLst>
+                <a:ext uri="{FF2B5EF4-FFF2-40B4-BE49-F238E27FC236}">
+                  <a16:creationId xmlns:a16="http://schemas.microsoft.com/office/drawing/2014/main" id="{43FD8E7F-E514-434F-B51F-FC92BFEF34ED}"/>
+                </a:ext>
+              </a:extLst>
+            </p:cNvPr>
+            <p:cNvCxnSpPr>
+              <a:cxnSpLocks/>
+            </p:cNvCxnSpPr>
+            <p:nvPr/>
+          </p:nvCxnSpPr>
+          <p:spPr>
+            <a:xfrm>
+              <a:off x="7137533" y="1634567"/>
+              <a:ext cx="1018210" cy="0"/>
+            </a:xfrm>
+            <a:prstGeom prst="straightConnector1">
+              <a:avLst/>
+            </a:prstGeom>
+            <a:ln>
+              <a:solidFill>
+                <a:schemeClr val="tx1"/>
+              </a:solidFill>
+              <a:tailEnd type="triangle" w="lg" len="lg"/>
+            </a:ln>
+          </p:spPr>
+          <p:style>
+            <a:lnRef idx="1">
+              <a:schemeClr val="accent1"/>
+            </a:lnRef>
+            <a:fillRef idx="0">
+              <a:schemeClr val="accent1"/>
+            </a:fillRef>
+            <a:effectRef idx="0">
+              <a:schemeClr val="accent1"/>
+            </a:effectRef>
+            <a:fontRef idx="minor">
+              <a:schemeClr val="tx1"/>
+            </a:fontRef>
+          </p:style>
+        </p:cxnSp>
+        <p:cxnSp>
+          <p:nvCxnSpPr>
+            <p:cNvPr id="94" name="Straight Arrow Connector 93">
+              <a:extLst>
+                <a:ext uri="{FF2B5EF4-FFF2-40B4-BE49-F238E27FC236}">
+                  <a16:creationId xmlns:a16="http://schemas.microsoft.com/office/drawing/2014/main" id="{417F4992-2F28-4F19-9DFE-4279FB08EAE1}"/>
+                </a:ext>
+              </a:extLst>
+            </p:cNvPr>
+            <p:cNvCxnSpPr>
+              <a:cxnSpLocks/>
+            </p:cNvCxnSpPr>
+            <p:nvPr/>
+          </p:nvCxnSpPr>
+          <p:spPr>
+            <a:xfrm>
+              <a:off x="10336169" y="1634567"/>
+              <a:ext cx="396000" cy="0"/>
+            </a:xfrm>
+            <a:prstGeom prst="straightConnector1">
+              <a:avLst/>
+            </a:prstGeom>
+            <a:ln>
+              <a:solidFill>
+                <a:schemeClr val="tx1"/>
+              </a:solidFill>
+              <a:tailEnd type="triangle" w="lg" len="lg"/>
+            </a:ln>
+          </p:spPr>
+          <p:style>
+            <a:lnRef idx="1">
+              <a:schemeClr val="accent1"/>
+            </a:lnRef>
+            <a:fillRef idx="0">
+              <a:schemeClr val="accent1"/>
+            </a:fillRef>
+            <a:effectRef idx="0">
+              <a:schemeClr val="accent1"/>
+            </a:effectRef>
+            <a:fontRef idx="minor">
+              <a:schemeClr val="tx1"/>
+            </a:fontRef>
+          </p:style>
+        </p:cxnSp>
+        <p:cxnSp>
+          <p:nvCxnSpPr>
+            <p:cNvPr id="95" name="Straight Arrow Connector 94">
+              <a:extLst>
+                <a:ext uri="{FF2B5EF4-FFF2-40B4-BE49-F238E27FC236}">
+                  <a16:creationId xmlns:a16="http://schemas.microsoft.com/office/drawing/2014/main" id="{D0349D8A-15B6-496F-9BE8-382A94F217C2}"/>
+                </a:ext>
+              </a:extLst>
+            </p:cNvPr>
+            <p:cNvCxnSpPr>
+              <a:cxnSpLocks/>
+            </p:cNvCxnSpPr>
+            <p:nvPr/>
+          </p:nvCxnSpPr>
+          <p:spPr>
+            <a:xfrm flipH="1">
+              <a:off x="2334690" y="1905861"/>
+              <a:ext cx="309563" cy="0"/>
+            </a:xfrm>
+            <a:prstGeom prst="straightConnector1">
+              <a:avLst/>
+            </a:prstGeom>
+            <a:ln>
+              <a:solidFill>
+                <a:schemeClr val="tx1"/>
+              </a:solidFill>
+              <a:tailEnd type="triangle" w="lg" len="lg"/>
+            </a:ln>
+          </p:spPr>
+          <p:style>
+            <a:lnRef idx="1">
+              <a:schemeClr val="accent1"/>
+            </a:lnRef>
+            <a:fillRef idx="0">
+              <a:schemeClr val="accent1"/>
+            </a:fillRef>
+            <a:effectRef idx="0">
+              <a:schemeClr val="accent1"/>
+            </a:effectRef>
+            <a:fontRef idx="minor">
+              <a:schemeClr val="tx1"/>
+            </a:fontRef>
+          </p:style>
+        </p:cxnSp>
+        <p:cxnSp>
+          <p:nvCxnSpPr>
+            <p:cNvPr id="96" name="Straight Arrow Connector 95">
+              <a:extLst>
+                <a:ext uri="{FF2B5EF4-FFF2-40B4-BE49-F238E27FC236}">
+                  <a16:creationId xmlns:a16="http://schemas.microsoft.com/office/drawing/2014/main" id="{034997D4-BB4F-42A6-9E9F-509C5337AEBE}"/>
+                </a:ext>
+              </a:extLst>
+            </p:cNvPr>
+            <p:cNvCxnSpPr>
+              <a:cxnSpLocks/>
+            </p:cNvCxnSpPr>
+            <p:nvPr/>
+          </p:nvCxnSpPr>
+          <p:spPr>
+            <a:xfrm flipH="1">
+              <a:off x="4412084" y="1905861"/>
+              <a:ext cx="309563" cy="0"/>
+            </a:xfrm>
+            <a:prstGeom prst="straightConnector1">
+              <a:avLst/>
+            </a:prstGeom>
+            <a:ln>
+              <a:solidFill>
+                <a:schemeClr val="tx1"/>
+              </a:solidFill>
+              <a:tailEnd type="triangle" w="lg" len="lg"/>
+            </a:ln>
+          </p:spPr>
+          <p:style>
+            <a:lnRef idx="1">
+              <a:schemeClr val="accent1"/>
+            </a:lnRef>
+            <a:fillRef idx="0">
+              <a:schemeClr val="accent1"/>
+            </a:fillRef>
+            <a:effectRef idx="0">
+              <a:schemeClr val="accent1"/>
+            </a:effectRef>
+            <a:fontRef idx="minor">
+              <a:schemeClr val="tx1"/>
+            </a:fontRef>
+          </p:style>
+        </p:cxnSp>
+        <p:cxnSp>
+          <p:nvCxnSpPr>
+            <p:cNvPr id="97" name="Straight Arrow Connector 96">
+              <a:extLst>
+                <a:ext uri="{FF2B5EF4-FFF2-40B4-BE49-F238E27FC236}">
+                  <a16:creationId xmlns:a16="http://schemas.microsoft.com/office/drawing/2014/main" id="{58C725FC-ADA8-4CDF-8FA4-6D2FEDB1EFC9}"/>
+                </a:ext>
+              </a:extLst>
+            </p:cNvPr>
+            <p:cNvCxnSpPr>
+              <a:cxnSpLocks/>
+            </p:cNvCxnSpPr>
+            <p:nvPr/>
+          </p:nvCxnSpPr>
+          <p:spPr>
+            <a:xfrm flipH="1">
+              <a:off x="7137533" y="1904075"/>
+              <a:ext cx="1018210" cy="0"/>
+            </a:xfrm>
+            <a:prstGeom prst="straightConnector1">
+              <a:avLst/>
+            </a:prstGeom>
+            <a:ln>
+              <a:solidFill>
+                <a:schemeClr val="tx1"/>
+              </a:solidFill>
+              <a:tailEnd type="triangle" w="lg" len="lg"/>
+            </a:ln>
+          </p:spPr>
+          <p:style>
+            <a:lnRef idx="1">
+              <a:schemeClr val="accent1"/>
+            </a:lnRef>
+            <a:fillRef idx="0">
+              <a:schemeClr val="accent1"/>
+            </a:fillRef>
+            <a:effectRef idx="0">
+              <a:schemeClr val="accent1"/>
+            </a:effectRef>
+            <a:fontRef idx="minor">
+              <a:schemeClr val="tx1"/>
+            </a:fontRef>
+          </p:style>
+        </p:cxnSp>
+        <p:cxnSp>
+          <p:nvCxnSpPr>
+            <p:cNvPr id="98" name="Straight Arrow Connector 97">
+              <a:extLst>
+                <a:ext uri="{FF2B5EF4-FFF2-40B4-BE49-F238E27FC236}">
+                  <a16:creationId xmlns:a16="http://schemas.microsoft.com/office/drawing/2014/main" id="{21F2869C-A86B-4921-B99D-7A10BB562A7A}"/>
+                </a:ext>
+              </a:extLst>
+            </p:cNvPr>
+            <p:cNvCxnSpPr>
+              <a:cxnSpLocks/>
+            </p:cNvCxnSpPr>
+            <p:nvPr/>
+          </p:nvCxnSpPr>
+          <p:spPr>
+            <a:xfrm flipH="1">
+              <a:off x="10336169" y="1904075"/>
+              <a:ext cx="396000" cy="0"/>
+            </a:xfrm>
+            <a:prstGeom prst="straightConnector1">
+              <a:avLst/>
+            </a:prstGeom>
+            <a:ln>
+              <a:solidFill>
+                <a:schemeClr val="tx1"/>
+              </a:solidFill>
+              <a:tailEnd type="triangle" w="lg" len="lg"/>
+            </a:ln>
+          </p:spPr>
+          <p:style>
+            <a:lnRef idx="1">
+              <a:schemeClr val="accent1"/>
+            </a:lnRef>
+            <a:fillRef idx="0">
+              <a:schemeClr val="accent1"/>
+            </a:fillRef>
+            <a:effectRef idx="0">
+              <a:schemeClr val="accent1"/>
+            </a:effectRef>
+            <a:fontRef idx="minor">
+              <a:schemeClr val="tx1"/>
+            </a:fontRef>
+          </p:style>
+        </p:cxnSp>
+        <p:sp>
+          <p:nvSpPr>
+            <p:cNvPr id="99" name="TextBox 98">
+              <a:extLst>
+                <a:ext uri="{FF2B5EF4-FFF2-40B4-BE49-F238E27FC236}">
+                  <a16:creationId xmlns:a16="http://schemas.microsoft.com/office/drawing/2014/main" id="{438D4C43-382A-4E70-BD37-6AADB465C5E5}"/>
+                </a:ext>
+              </a:extLst>
+            </p:cNvPr>
+            <p:cNvSpPr txBox="1"/>
+            <p:nvPr/>
+          </p:nvSpPr>
+          <p:spPr>
+            <a:xfrm>
+              <a:off x="487600" y="1449901"/>
+              <a:ext cx="1847089" cy="307777"/>
+            </a:xfrm>
+            <a:prstGeom prst="rect">
+              <a:avLst/>
+            </a:prstGeom>
+            <a:noFill/>
+          </p:spPr>
+          <p:txBody>
+            <a:bodyPr wrap="square" rtlCol="0">
+              <a:spAutoFit/>
+            </a:bodyPr>
+            <a:lstStyle/>
+            <a:p>
+              <a:pPr algn="ctr"/>
+              <a:r>
+                <a:rPr lang="en-US" sz="1400" dirty="0"/>
+                <a:t>calculate hash digest</a:t>
+              </a:r>
+            </a:p>
+          </p:txBody>
+        </p:sp>
+        <p:sp>
+          <p:nvSpPr>
+            <p:cNvPr id="100" name="TextBox 99">
+              <a:extLst>
+                <a:ext uri="{FF2B5EF4-FFF2-40B4-BE49-F238E27FC236}">
+                  <a16:creationId xmlns:a16="http://schemas.microsoft.com/office/drawing/2014/main" id="{F9B2C732-0831-45B6-B0F3-F20C137C84DE}"/>
+                </a:ext>
+              </a:extLst>
+            </p:cNvPr>
+            <p:cNvSpPr txBox="1"/>
+            <p:nvPr/>
+          </p:nvSpPr>
+          <p:spPr>
+            <a:xfrm>
+              <a:off x="2632833" y="1449901"/>
+              <a:ext cx="1764730" cy="648000"/>
+            </a:xfrm>
+            <a:prstGeom prst="rect">
+              <a:avLst/>
+            </a:prstGeom>
+            <a:noFill/>
+          </p:spPr>
+          <p:txBody>
+            <a:bodyPr wrap="square" rtlCol="0" anchor="ctr" anchorCtr="0">
+              <a:noAutofit/>
+            </a:bodyPr>
+            <a:lstStyle/>
+            <a:p>
+              <a:pPr algn="ctr"/>
+              <a:r>
+                <a:rPr lang="en-US" sz="1400"/>
+                <a:t>call crypto provider</a:t>
+              </a:r>
+            </a:p>
+          </p:txBody>
+        </p:sp>
+        <p:sp>
+          <p:nvSpPr>
+            <p:cNvPr id="101" name="TextBox 100">
+              <a:extLst>
+                <a:ext uri="{FF2B5EF4-FFF2-40B4-BE49-F238E27FC236}">
+                  <a16:creationId xmlns:a16="http://schemas.microsoft.com/office/drawing/2014/main" id="{5C392BD6-51DF-43FE-8456-92B9FF8239AC}"/>
+                </a:ext>
+              </a:extLst>
+            </p:cNvPr>
+            <p:cNvSpPr txBox="1"/>
+            <p:nvPr/>
+          </p:nvSpPr>
+          <p:spPr>
+            <a:xfrm>
+              <a:off x="4734561" y="1449901"/>
+              <a:ext cx="2415886" cy="648000"/>
+            </a:xfrm>
+            <a:prstGeom prst="rect">
+              <a:avLst/>
+            </a:prstGeom>
+            <a:noFill/>
+          </p:spPr>
+          <p:txBody>
+            <a:bodyPr wrap="square" rtlCol="0" anchor="ctr" anchorCtr="0">
+              <a:noAutofit/>
+            </a:bodyPr>
+            <a:lstStyle/>
+            <a:p>
+              <a:pPr algn="ctr"/>
+              <a:r>
+                <a:rPr lang="en-US" sz="1400" dirty="0"/>
+                <a:t>call SignPath with credentials, project, signing policy</a:t>
+              </a:r>
+            </a:p>
+          </p:txBody>
+        </p:sp>
+        <p:sp>
+          <p:nvSpPr>
+            <p:cNvPr id="102" name="TextBox 101">
+              <a:extLst>
+                <a:ext uri="{FF2B5EF4-FFF2-40B4-BE49-F238E27FC236}">
+                  <a16:creationId xmlns:a16="http://schemas.microsoft.com/office/drawing/2014/main" id="{95B093E8-AB5C-4E50-B6DE-5199A762C8A4}"/>
+                </a:ext>
+              </a:extLst>
+            </p:cNvPr>
+            <p:cNvSpPr txBox="1"/>
+            <p:nvPr/>
+          </p:nvSpPr>
+          <p:spPr>
+            <a:xfrm>
+              <a:off x="8155743" y="1323809"/>
+              <a:ext cx="2180426" cy="918808"/>
+            </a:xfrm>
+            <a:prstGeom prst="rect">
+              <a:avLst/>
+            </a:prstGeom>
+            <a:noFill/>
+          </p:spPr>
+          <p:txBody>
+            <a:bodyPr wrap="square" rtlCol="0" anchor="ctr" anchorCtr="0">
+              <a:noAutofit/>
+            </a:bodyPr>
+            <a:lstStyle/>
+            <a:p>
+              <a:pPr marL="182563" indent="-182563">
+                <a:buFont typeface="Arial" panose="020B0604020202020204" pitchFamily="34" charset="0"/>
+                <a:buChar char="•"/>
+              </a:pPr>
+              <a:r>
+                <a:rPr lang="en-US" sz="1400" dirty="0">
+                  <a:solidFill>
+                    <a:schemeClr val="bg1"/>
+                  </a:solidFill>
+                </a:rPr>
+                <a:t>verify permissions</a:t>
+              </a:r>
+            </a:p>
+            <a:p>
+              <a:pPr marL="182563" indent="-182563">
+                <a:buFont typeface="Arial" panose="020B0604020202020204" pitchFamily="34" charset="0"/>
+                <a:buChar char="•"/>
+              </a:pPr>
+              <a:r>
+                <a:rPr lang="en-US" sz="1400" dirty="0">
+                  <a:solidFill>
+                    <a:schemeClr val="bg1"/>
+                  </a:solidFill>
+                </a:rPr>
+                <a:t>select key/certificate</a:t>
+              </a:r>
+            </a:p>
+            <a:p>
+              <a:pPr marL="182563" indent="-182563">
+                <a:buFont typeface="Arial" panose="020B0604020202020204" pitchFamily="34" charset="0"/>
+                <a:buChar char="•"/>
+              </a:pPr>
+              <a:r>
+                <a:rPr lang="en-US" sz="1400" dirty="0">
+                  <a:solidFill>
+                    <a:schemeClr val="bg1"/>
+                  </a:solidFill>
+                </a:rPr>
+                <a:t>call HSM</a:t>
+              </a:r>
+            </a:p>
+            <a:p>
+              <a:pPr marL="182563" indent="-182563">
+                <a:buFont typeface="Arial" panose="020B0604020202020204" pitchFamily="34" charset="0"/>
+                <a:buChar char="•"/>
+              </a:pPr>
+              <a:r>
+                <a:rPr lang="en-US" sz="1400" dirty="0">
+                  <a:solidFill>
+                    <a:schemeClr val="bg1"/>
+                  </a:solidFill>
+                </a:rPr>
+                <a:t>audit signing</a:t>
+              </a:r>
+            </a:p>
+          </p:txBody>
+        </p:sp>
+        <p:sp>
+          <p:nvSpPr>
+            <p:cNvPr id="103" name="TextBox 102">
+              <a:extLst>
+                <a:ext uri="{FF2B5EF4-FFF2-40B4-BE49-F238E27FC236}">
+                  <a16:creationId xmlns:a16="http://schemas.microsoft.com/office/drawing/2014/main" id="{1236D719-568D-4A43-977B-8166647556F8}"/>
+                </a:ext>
+              </a:extLst>
+            </p:cNvPr>
+            <p:cNvSpPr txBox="1"/>
+            <p:nvPr/>
+          </p:nvSpPr>
+          <p:spPr>
+            <a:xfrm>
+              <a:off x="10732169" y="1459213"/>
+              <a:ext cx="1169773" cy="648000"/>
+            </a:xfrm>
+            <a:prstGeom prst="rect">
+              <a:avLst/>
+            </a:prstGeom>
+            <a:noFill/>
+          </p:spPr>
+          <p:txBody>
+            <a:bodyPr wrap="square" rtlCol="0" anchor="ctr" anchorCtr="0">
+              <a:noAutofit/>
+            </a:bodyPr>
+            <a:lstStyle/>
+            <a:p>
+              <a:pPr algn="ctr"/>
+              <a:r>
+                <a:rPr lang="en-US" sz="1400" dirty="0"/>
+                <a:t>sign hash digest</a:t>
+              </a:r>
+            </a:p>
+          </p:txBody>
+        </p:sp>
+        <p:sp>
+          <p:nvSpPr>
+            <p:cNvPr id="104" name="TextBox 103">
+              <a:extLst>
+                <a:ext uri="{FF2B5EF4-FFF2-40B4-BE49-F238E27FC236}">
+                  <a16:creationId xmlns:a16="http://schemas.microsoft.com/office/drawing/2014/main" id="{1C69EE09-6994-4743-9755-6FD34A51A151}"/>
+                </a:ext>
+              </a:extLst>
+            </p:cNvPr>
+            <p:cNvSpPr txBox="1"/>
+            <p:nvPr/>
+          </p:nvSpPr>
+          <p:spPr>
+            <a:xfrm>
+              <a:off x="487600" y="1750186"/>
+              <a:ext cx="1847089" cy="307777"/>
+            </a:xfrm>
+            <a:prstGeom prst="rect">
+              <a:avLst/>
+            </a:prstGeom>
+            <a:noFill/>
+          </p:spPr>
+          <p:txBody>
+            <a:bodyPr wrap="square" rtlCol="0">
+              <a:spAutoFit/>
+            </a:bodyPr>
+            <a:lstStyle/>
+            <a:p>
+              <a:pPr algn="ctr"/>
+              <a:r>
+                <a:rPr lang="en-US" sz="1400"/>
+                <a:t>write signature to file</a:t>
+              </a:r>
+            </a:p>
+          </p:txBody>
+        </p:sp>
+        <p:sp>
+          <p:nvSpPr>
+            <p:cNvPr id="105" name="TextBox 104">
+              <a:extLst>
+                <a:ext uri="{FF2B5EF4-FFF2-40B4-BE49-F238E27FC236}">
+                  <a16:creationId xmlns:a16="http://schemas.microsoft.com/office/drawing/2014/main" id="{0AAD993C-AD65-4CD8-A561-0F499478A568}"/>
+                </a:ext>
+              </a:extLst>
+            </p:cNvPr>
+            <p:cNvSpPr txBox="1"/>
+            <p:nvPr/>
+          </p:nvSpPr>
+          <p:spPr>
+            <a:xfrm>
+              <a:off x="606392" y="2442628"/>
+              <a:ext cx="1622767" cy="307777"/>
+            </a:xfrm>
+            <a:prstGeom prst="rect">
+              <a:avLst/>
+            </a:prstGeom>
+            <a:solidFill>
+              <a:schemeClr val="bg1">
+                <a:lumMod val="50000"/>
+              </a:schemeClr>
             </a:solidFill>
-          </a:ln>
-        </p:spPr>
-        <p:txBody>
-          <a:bodyPr wrap="square" rtlCol="0">
-            <a:noAutofit/>
-          </a:bodyPr>
-          <a:lstStyle/>
-          <a:p>
-            <a:r>
-              <a:rPr lang="en-US" b="1"/>
-              <a:t>Build Node or PC</a:t>
-            </a:r>
-          </a:p>
-        </p:txBody>
-      </p:sp>
-      <p:sp>
-        <p:nvSpPr>
-          <p:cNvPr id="86" name="TextBox 85">
-            <a:extLst>
-              <a:ext uri="{FF2B5EF4-FFF2-40B4-BE49-F238E27FC236}">
-                <a16:creationId xmlns:a16="http://schemas.microsoft.com/office/drawing/2014/main" id="{ABA3453E-A4C6-4F56-9212-606CBA299D0A}"/>
-              </a:ext>
-            </a:extLst>
-          </p:cNvPr>
-          <p:cNvSpPr txBox="1"/>
-          <p:nvPr/>
-        </p:nvSpPr>
-        <p:spPr>
-          <a:xfrm>
-            <a:off x="500514" y="834231"/>
-            <a:ext cx="1834176" cy="2912899"/>
-          </a:xfrm>
-          <a:prstGeom prst="rect">
-            <a:avLst/>
-          </a:prstGeom>
-          <a:solidFill>
-            <a:srgbClr val="FFC000"/>
-          </a:solidFill>
-          <a:ln>
+            <a:ln>
+              <a:solidFill>
+                <a:schemeClr val="tx1"/>
+              </a:solidFill>
+            </a:ln>
+          </p:spPr>
+          <p:txBody>
+            <a:bodyPr wrap="square" rtlCol="0">
+              <a:spAutoFit/>
+            </a:bodyPr>
+            <a:lstStyle/>
+            <a:p>
+              <a:pPr algn="ctr"/>
+              <a:r>
+                <a:rPr lang="en-US" sz="1400">
+                  <a:solidFill>
+                    <a:schemeClr val="bg1"/>
+                  </a:solidFill>
+                </a:rPr>
+                <a:t>OpenSSL</a:t>
+              </a:r>
+            </a:p>
+          </p:txBody>
+        </p:sp>
+        <p:sp>
+          <p:nvSpPr>
+            <p:cNvPr id="106" name="TextBox 105">
+              <a:extLst>
+                <a:ext uri="{FF2B5EF4-FFF2-40B4-BE49-F238E27FC236}">
+                  <a16:creationId xmlns:a16="http://schemas.microsoft.com/office/drawing/2014/main" id="{D736A967-40DC-4011-BF8B-52256685C19C}"/>
+                </a:ext>
+              </a:extLst>
+            </p:cNvPr>
+            <p:cNvSpPr txBox="1"/>
+            <p:nvPr/>
+          </p:nvSpPr>
+          <p:spPr>
+            <a:xfrm>
+              <a:off x="2756380" y="2442626"/>
+              <a:ext cx="1540476" cy="307777"/>
+            </a:xfrm>
+            <a:prstGeom prst="rect">
+              <a:avLst/>
+            </a:prstGeom>
             <a:solidFill>
-              <a:schemeClr val="tx1"/>
+              <a:schemeClr val="bg1">
+                <a:lumMod val="50000"/>
+              </a:schemeClr>
             </a:solidFill>
-          </a:ln>
-        </p:spPr>
-        <p:txBody>
-          <a:bodyPr wrap="square" rtlCol="0">
-            <a:noAutofit/>
-          </a:bodyPr>
-          <a:lstStyle/>
-          <a:p>
-            <a:pPr algn="ctr"/>
-            <a:r>
-              <a:rPr lang="en-US"/>
-              <a:t>Signing Tool</a:t>
-            </a:r>
-          </a:p>
-        </p:txBody>
-      </p:sp>
-      <p:sp>
-        <p:nvSpPr>
-          <p:cNvPr id="87" name="TextBox 86">
-            <a:extLst>
-              <a:ext uri="{FF2B5EF4-FFF2-40B4-BE49-F238E27FC236}">
-                <a16:creationId xmlns:a16="http://schemas.microsoft.com/office/drawing/2014/main" id="{72335272-C8F1-43BC-AD04-306BA0FFE9CF}"/>
-              </a:ext>
-            </a:extLst>
-          </p:cNvPr>
-          <p:cNvSpPr txBox="1"/>
-          <p:nvPr/>
-        </p:nvSpPr>
-        <p:spPr>
-          <a:xfrm>
-            <a:off x="2644253" y="834231"/>
-            <a:ext cx="1764730" cy="2912899"/>
-          </a:xfrm>
-          <a:prstGeom prst="rect">
-            <a:avLst/>
-          </a:prstGeom>
-          <a:solidFill>
-            <a:srgbClr val="FFC000"/>
-          </a:solidFill>
-          <a:ln>
+            <a:ln>
+              <a:solidFill>
+                <a:schemeClr val="tx1"/>
+              </a:solidFill>
+            </a:ln>
+          </p:spPr>
+          <p:txBody>
+            <a:bodyPr wrap="square" rtlCol="0">
+              <a:spAutoFit/>
+            </a:bodyPr>
+            <a:lstStyle/>
+            <a:p>
+              <a:pPr algn="ctr"/>
+              <a:r>
+                <a:rPr lang="en-US" sz="1400" dirty="0">
+                  <a:solidFill>
+                    <a:schemeClr val="bg1"/>
+                  </a:solidFill>
+                </a:rPr>
+                <a:t>Cryptoki engine</a:t>
+              </a:r>
+            </a:p>
+          </p:txBody>
+        </p:sp>
+        <p:sp>
+          <p:nvSpPr>
+            <p:cNvPr id="107" name="TextBox 106">
+              <a:extLst>
+                <a:ext uri="{FF2B5EF4-FFF2-40B4-BE49-F238E27FC236}">
+                  <a16:creationId xmlns:a16="http://schemas.microsoft.com/office/drawing/2014/main" id="{A22C1ABA-748A-4F57-9BE5-A826408343E1}"/>
+                </a:ext>
+              </a:extLst>
+            </p:cNvPr>
+            <p:cNvSpPr txBox="1"/>
+            <p:nvPr/>
+          </p:nvSpPr>
+          <p:spPr>
+            <a:xfrm>
+              <a:off x="4875147" y="2442627"/>
+              <a:ext cx="2108886" cy="307777"/>
+            </a:xfrm>
+            <a:prstGeom prst="rect">
+              <a:avLst/>
+            </a:prstGeom>
             <a:solidFill>
-              <a:schemeClr val="tx1"/>
+              <a:srgbClr val="00B0F0"/>
             </a:solidFill>
-          </a:ln>
-        </p:spPr>
-        <p:txBody>
-          <a:bodyPr wrap="square" rtlCol="0">
-            <a:noAutofit/>
-          </a:bodyPr>
-          <a:lstStyle/>
-          <a:p>
-            <a:pPr algn="ctr"/>
-            <a:r>
-              <a:rPr lang="en-US"/>
-              <a:t>API or Engine</a:t>
-            </a:r>
-          </a:p>
-        </p:txBody>
-      </p:sp>
-      <p:sp>
-        <p:nvSpPr>
-          <p:cNvPr id="88" name="TextBox 87">
-            <a:extLst>
-              <a:ext uri="{FF2B5EF4-FFF2-40B4-BE49-F238E27FC236}">
-                <a16:creationId xmlns:a16="http://schemas.microsoft.com/office/drawing/2014/main" id="{02A548F8-4E1F-4A4C-82EA-045C2335CCD9}"/>
-              </a:ext>
-            </a:extLst>
-          </p:cNvPr>
-          <p:cNvSpPr txBox="1"/>
-          <p:nvPr/>
-        </p:nvSpPr>
-        <p:spPr>
-          <a:xfrm>
-            <a:off x="4721647" y="834231"/>
-            <a:ext cx="2415886" cy="2912899"/>
-          </a:xfrm>
-          <a:prstGeom prst="rect">
-            <a:avLst/>
-          </a:prstGeom>
-          <a:solidFill>
-            <a:srgbClr val="FFC000"/>
-          </a:solidFill>
-          <a:ln>
+            <a:ln>
+              <a:solidFill>
+                <a:schemeClr val="tx1"/>
+              </a:solidFill>
+            </a:ln>
+          </p:spPr>
+          <p:txBody>
+            <a:bodyPr wrap="square" rtlCol="0">
+              <a:spAutoFit/>
+            </a:bodyPr>
+            <a:lstStyle/>
+            <a:p>
+              <a:pPr algn="ctr"/>
+              <a:r>
+                <a:rPr lang="en-US" sz="1400" dirty="0">
+                  <a:solidFill>
+                    <a:schemeClr val="bg1"/>
+                  </a:solidFill>
+                </a:rPr>
+                <a:t>SignPath Cryptoki library</a:t>
+              </a:r>
+            </a:p>
+          </p:txBody>
+        </p:sp>
+        <p:sp>
+          <p:nvSpPr>
+            <p:cNvPr id="108" name="TextBox 107">
+              <a:extLst>
+                <a:ext uri="{FF2B5EF4-FFF2-40B4-BE49-F238E27FC236}">
+                  <a16:creationId xmlns:a16="http://schemas.microsoft.com/office/drawing/2014/main" id="{FC25D197-D620-4FB6-9E52-9E2F8096DE7E}"/>
+                </a:ext>
+              </a:extLst>
+            </p:cNvPr>
+            <p:cNvSpPr txBox="1"/>
+            <p:nvPr/>
+          </p:nvSpPr>
+          <p:spPr>
+            <a:xfrm>
+              <a:off x="606392" y="2930289"/>
+              <a:ext cx="1622767" cy="307777"/>
+            </a:xfrm>
+            <a:prstGeom prst="rect">
+              <a:avLst/>
+            </a:prstGeom>
             <a:solidFill>
-              <a:schemeClr val="tx1"/>
+              <a:schemeClr val="bg1">
+                <a:lumMod val="50000"/>
+              </a:schemeClr>
             </a:solidFill>
-          </a:ln>
-        </p:spPr>
-        <p:txBody>
-          <a:bodyPr wrap="square" rtlCol="0">
-            <a:noAutofit/>
-          </a:bodyPr>
-          <a:lstStyle/>
-          <a:p>
-            <a:pPr algn="ctr"/>
-            <a:r>
-              <a:rPr lang="en-US"/>
-              <a:t>Crypto Provider</a:t>
-            </a:r>
-          </a:p>
-        </p:txBody>
-      </p:sp>
-      <p:sp>
-        <p:nvSpPr>
-          <p:cNvPr id="89" name="TextBox 88">
-            <a:extLst>
-              <a:ext uri="{FF2B5EF4-FFF2-40B4-BE49-F238E27FC236}">
-                <a16:creationId xmlns:a16="http://schemas.microsoft.com/office/drawing/2014/main" id="{08788219-EB4D-409E-B07C-5730BB942A1F}"/>
-              </a:ext>
-            </a:extLst>
-          </p:cNvPr>
-          <p:cNvSpPr txBox="1"/>
-          <p:nvPr/>
-        </p:nvSpPr>
-        <p:spPr>
-          <a:xfrm>
-            <a:off x="8155743" y="834231"/>
-            <a:ext cx="2180426" cy="2912899"/>
-          </a:xfrm>
-          <a:prstGeom prst="rect">
-            <a:avLst/>
-          </a:prstGeom>
-          <a:solidFill>
-            <a:srgbClr val="00B0F0"/>
-          </a:solidFill>
-          <a:ln>
+            <a:ln>
+              <a:solidFill>
+                <a:schemeClr val="tx1"/>
+              </a:solidFill>
+            </a:ln>
+          </p:spPr>
+          <p:txBody>
+            <a:bodyPr wrap="square" rtlCol="0">
+              <a:spAutoFit/>
+            </a:bodyPr>
+            <a:lstStyle/>
+            <a:p>
+              <a:pPr algn="ctr"/>
+              <a:r>
+                <a:rPr lang="en-US" sz="1400" dirty="0">
+                  <a:solidFill>
+                    <a:schemeClr val="bg1"/>
+                  </a:solidFill>
+                </a:rPr>
+                <a:t>SignTool.exe</a:t>
+              </a:r>
+            </a:p>
+          </p:txBody>
+        </p:sp>
+        <p:sp>
+          <p:nvSpPr>
+            <p:cNvPr id="109" name="TextBox 108">
+              <a:extLst>
+                <a:ext uri="{FF2B5EF4-FFF2-40B4-BE49-F238E27FC236}">
+                  <a16:creationId xmlns:a16="http://schemas.microsoft.com/office/drawing/2014/main" id="{1DB52A4F-345D-4F69-AD7A-6178390C7D85}"/>
+                </a:ext>
+              </a:extLst>
+            </p:cNvPr>
+            <p:cNvSpPr txBox="1"/>
+            <p:nvPr/>
+          </p:nvSpPr>
+          <p:spPr>
+            <a:xfrm>
+              <a:off x="2756380" y="3261402"/>
+              <a:ext cx="1540476" cy="307777"/>
+            </a:xfrm>
+            <a:prstGeom prst="rect">
+              <a:avLst/>
+            </a:prstGeom>
             <a:solidFill>
-              <a:schemeClr val="tx1"/>
+              <a:schemeClr val="bg1">
+                <a:lumMod val="50000"/>
+              </a:schemeClr>
             </a:solidFill>
-          </a:ln>
-        </p:spPr>
-        <p:txBody>
-          <a:bodyPr wrap="square" rtlCol="0" anchor="t" anchorCtr="0">
-            <a:noAutofit/>
-          </a:bodyPr>
-          <a:lstStyle/>
-          <a:p>
-            <a:pPr algn="ctr"/>
-            <a:r>
-              <a:rPr lang="en-US" b="1">
-                <a:solidFill>
-                  <a:schemeClr val="bg1"/>
-                </a:solidFill>
-              </a:rPr>
-              <a:t>SignPath</a:t>
-            </a:r>
-          </a:p>
-        </p:txBody>
-      </p:sp>
-      <p:sp>
-        <p:nvSpPr>
-          <p:cNvPr id="90" name="TextBox 89">
-            <a:extLst>
-              <a:ext uri="{FF2B5EF4-FFF2-40B4-BE49-F238E27FC236}">
-                <a16:creationId xmlns:a16="http://schemas.microsoft.com/office/drawing/2014/main" id="{34919C27-DFA0-4D8A-A601-A59528F5E4B6}"/>
-              </a:ext>
-            </a:extLst>
-          </p:cNvPr>
-          <p:cNvSpPr txBox="1"/>
-          <p:nvPr/>
-        </p:nvSpPr>
-        <p:spPr>
-          <a:xfrm>
-            <a:off x="10732169" y="834231"/>
-            <a:ext cx="1169773" cy="2912899"/>
-          </a:xfrm>
-          <a:prstGeom prst="rect">
-            <a:avLst/>
-          </a:prstGeom>
-          <a:solidFill>
-            <a:srgbClr val="FFC000"/>
-          </a:solidFill>
-          <a:ln>
+            <a:ln>
+              <a:solidFill>
+                <a:schemeClr val="tx1"/>
+              </a:solidFill>
+            </a:ln>
+          </p:spPr>
+          <p:txBody>
+            <a:bodyPr wrap="square" rtlCol="0">
+              <a:spAutoFit/>
+            </a:bodyPr>
+            <a:lstStyle/>
+            <a:p>
+              <a:pPr algn="ctr"/>
+              <a:r>
+                <a:rPr lang="en-US" sz="1400" dirty="0">
+                  <a:solidFill>
+                    <a:schemeClr val="bg1"/>
+                  </a:solidFill>
+                </a:rPr>
+                <a:t>CNG</a:t>
+              </a:r>
+            </a:p>
+          </p:txBody>
+        </p:sp>
+        <p:sp>
+          <p:nvSpPr>
+            <p:cNvPr id="110" name="TextBox 109">
+              <a:extLst>
+                <a:ext uri="{FF2B5EF4-FFF2-40B4-BE49-F238E27FC236}">
+                  <a16:creationId xmlns:a16="http://schemas.microsoft.com/office/drawing/2014/main" id="{B0325DE6-B480-4280-978D-5A3568F7F823}"/>
+                </a:ext>
+              </a:extLst>
+            </p:cNvPr>
+            <p:cNvSpPr txBox="1"/>
+            <p:nvPr/>
+          </p:nvSpPr>
+          <p:spPr>
+            <a:xfrm>
+              <a:off x="4875147" y="3261403"/>
+              <a:ext cx="2108886" cy="307777"/>
+            </a:xfrm>
+            <a:prstGeom prst="rect">
+              <a:avLst/>
+            </a:prstGeom>
             <a:solidFill>
-              <a:schemeClr val="tx1"/>
+              <a:srgbClr val="00B0F0"/>
             </a:solidFill>
-          </a:ln>
-        </p:spPr>
-        <p:txBody>
-          <a:bodyPr wrap="square" rtlCol="0" anchor="t" anchorCtr="0">
-            <a:noAutofit/>
-          </a:bodyPr>
-          <a:lstStyle>
-            <a:defPPr>
-              <a:defRPr lang="de-DE"/>
-            </a:defPPr>
-          </a:lstStyle>
-          <a:p>
-            <a:pPr algn="ctr"/>
-            <a:r>
-              <a:rPr lang="en-US" b="1"/>
-              <a:t>HSM</a:t>
-            </a:r>
-          </a:p>
-        </p:txBody>
-      </p:sp>
-      <p:cxnSp>
-        <p:nvCxnSpPr>
-          <p:cNvPr id="91" name="Straight Arrow Connector 90">
-            <a:extLst>
-              <a:ext uri="{FF2B5EF4-FFF2-40B4-BE49-F238E27FC236}">
-                <a16:creationId xmlns:a16="http://schemas.microsoft.com/office/drawing/2014/main" id="{463C70AE-6F58-4FAC-9346-8DC6FEF4A6FB}"/>
-              </a:ext>
-            </a:extLst>
-          </p:cNvPr>
-          <p:cNvCxnSpPr/>
-          <p:nvPr/>
-        </p:nvCxnSpPr>
-        <p:spPr>
-          <a:xfrm>
-            <a:off x="2334690" y="1636353"/>
-            <a:ext cx="309563" cy="0"/>
-          </a:xfrm>
-          <a:prstGeom prst="straightConnector1">
-            <a:avLst/>
-          </a:prstGeom>
-          <a:ln>
+            <a:ln>
+              <a:solidFill>
+                <a:schemeClr val="tx1"/>
+              </a:solidFill>
+            </a:ln>
+          </p:spPr>
+          <p:txBody>
+            <a:bodyPr wrap="square" rtlCol="0">
+              <a:spAutoFit/>
+            </a:bodyPr>
+            <a:lstStyle/>
+            <a:p>
+              <a:pPr algn="ctr"/>
+              <a:r>
+                <a:rPr lang="en-US" sz="1400" dirty="0">
+                  <a:solidFill>
+                    <a:schemeClr val="bg1"/>
+                  </a:solidFill>
+                </a:rPr>
+                <a:t>SignPath KSP</a:t>
+              </a:r>
+            </a:p>
+          </p:txBody>
+        </p:sp>
+        <p:sp>
+          <p:nvSpPr>
+            <p:cNvPr id="111" name="TextBox 110">
+              <a:extLst>
+                <a:ext uri="{FF2B5EF4-FFF2-40B4-BE49-F238E27FC236}">
+                  <a16:creationId xmlns:a16="http://schemas.microsoft.com/office/drawing/2014/main" id="{86F76335-CDF4-4364-9006-2A8258C548E7}"/>
+                </a:ext>
+              </a:extLst>
+            </p:cNvPr>
+            <p:cNvSpPr txBox="1"/>
+            <p:nvPr/>
+          </p:nvSpPr>
+          <p:spPr>
+            <a:xfrm>
+              <a:off x="2756380" y="2852014"/>
+              <a:ext cx="1540476" cy="307777"/>
+            </a:xfrm>
+            <a:prstGeom prst="rect">
+              <a:avLst/>
+            </a:prstGeom>
             <a:solidFill>
-              <a:schemeClr val="tx1"/>
+              <a:schemeClr val="bg1">
+                <a:lumMod val="50000"/>
+              </a:schemeClr>
             </a:solidFill>
-            <a:tailEnd type="triangle" w="lg" len="lg"/>
-          </a:ln>
-        </p:spPr>
-        <p:style>
-          <a:lnRef idx="1">
-            <a:schemeClr val="accent1"/>
-          </a:lnRef>
-          <a:fillRef idx="0">
-            <a:schemeClr val="accent1"/>
-          </a:fillRef>
-          <a:effectRef idx="0">
-            <a:schemeClr val="accent1"/>
-          </a:effectRef>
-          <a:fontRef idx="minor">
-            <a:schemeClr val="tx1"/>
-          </a:fontRef>
-        </p:style>
-      </p:cxnSp>
-      <p:cxnSp>
-        <p:nvCxnSpPr>
-          <p:cNvPr id="92" name="Straight Arrow Connector 91">
-            <a:extLst>
-              <a:ext uri="{FF2B5EF4-FFF2-40B4-BE49-F238E27FC236}">
-                <a16:creationId xmlns:a16="http://schemas.microsoft.com/office/drawing/2014/main" id="{F6115A48-4EA1-4DF8-B139-75B85F693C80}"/>
-              </a:ext>
-            </a:extLst>
-          </p:cNvPr>
-          <p:cNvCxnSpPr/>
-          <p:nvPr/>
-        </p:nvCxnSpPr>
-        <p:spPr>
-          <a:xfrm>
-            <a:off x="4412084" y="1636353"/>
-            <a:ext cx="309563" cy="0"/>
-          </a:xfrm>
-          <a:prstGeom prst="straightConnector1">
-            <a:avLst/>
-          </a:prstGeom>
-          <a:ln>
+            <a:ln>
+              <a:solidFill>
+                <a:schemeClr val="tx1"/>
+              </a:solidFill>
+            </a:ln>
+          </p:spPr>
+          <p:txBody>
+            <a:bodyPr wrap="square" rtlCol="0">
+              <a:spAutoFit/>
+            </a:bodyPr>
+            <a:lstStyle/>
+            <a:p>
+              <a:pPr algn="ctr"/>
+              <a:r>
+                <a:rPr lang="en-US" sz="1400">
+                  <a:solidFill>
+                    <a:schemeClr val="bg1"/>
+                  </a:solidFill>
+                </a:rPr>
+                <a:t>CAPI</a:t>
+              </a:r>
+            </a:p>
+          </p:txBody>
+        </p:sp>
+        <p:sp>
+          <p:nvSpPr>
+            <p:cNvPr id="112" name="TextBox 111">
+              <a:extLst>
+                <a:ext uri="{FF2B5EF4-FFF2-40B4-BE49-F238E27FC236}">
+                  <a16:creationId xmlns:a16="http://schemas.microsoft.com/office/drawing/2014/main" id="{7E08DA84-26F3-4560-9326-18989FD222EC}"/>
+                </a:ext>
+              </a:extLst>
+            </p:cNvPr>
+            <p:cNvSpPr txBox="1"/>
+            <p:nvPr/>
+          </p:nvSpPr>
+          <p:spPr>
+            <a:xfrm>
+              <a:off x="4875147" y="2847728"/>
+              <a:ext cx="2108886" cy="307777"/>
+            </a:xfrm>
+            <a:prstGeom prst="rect">
+              <a:avLst/>
+            </a:prstGeom>
             <a:solidFill>
-              <a:schemeClr val="tx1"/>
+              <a:srgbClr val="00B0F0"/>
             </a:solidFill>
-            <a:tailEnd type="triangle" w="lg" len="lg"/>
-          </a:ln>
-        </p:spPr>
-        <p:style>
-          <a:lnRef idx="1">
-            <a:schemeClr val="accent1"/>
-          </a:lnRef>
-          <a:fillRef idx="0">
-            <a:schemeClr val="accent1"/>
-          </a:fillRef>
-          <a:effectRef idx="0">
-            <a:schemeClr val="accent1"/>
-          </a:effectRef>
-          <a:fontRef idx="minor">
-            <a:schemeClr val="tx1"/>
-          </a:fontRef>
-        </p:style>
-      </p:cxnSp>
-      <p:cxnSp>
-        <p:nvCxnSpPr>
-          <p:cNvPr id="93" name="Straight Arrow Connector 92">
-            <a:extLst>
-              <a:ext uri="{FF2B5EF4-FFF2-40B4-BE49-F238E27FC236}">
-                <a16:creationId xmlns:a16="http://schemas.microsoft.com/office/drawing/2014/main" id="{43FD8E7F-E514-434F-B51F-FC92BFEF34ED}"/>
-              </a:ext>
-            </a:extLst>
-          </p:cNvPr>
-          <p:cNvCxnSpPr>
-            <a:cxnSpLocks/>
-          </p:cNvCxnSpPr>
-          <p:nvPr/>
-        </p:nvCxnSpPr>
-        <p:spPr>
-          <a:xfrm>
-            <a:off x="7137533" y="1634567"/>
-            <a:ext cx="1018210" cy="0"/>
-          </a:xfrm>
-          <a:prstGeom prst="straightConnector1">
-            <a:avLst/>
-          </a:prstGeom>
-          <a:ln>
+            <a:ln>
+              <a:solidFill>
+                <a:schemeClr val="tx1"/>
+              </a:solidFill>
+            </a:ln>
+          </p:spPr>
+          <p:txBody>
+            <a:bodyPr wrap="square" rtlCol="0">
+              <a:spAutoFit/>
+            </a:bodyPr>
+            <a:lstStyle/>
+            <a:p>
+              <a:pPr algn="ctr"/>
+              <a:r>
+                <a:rPr lang="en-US" sz="1400">
+                  <a:solidFill>
+                    <a:schemeClr val="bg1"/>
+                  </a:solidFill>
+                </a:rPr>
+                <a:t>SignPath CSP</a:t>
+              </a:r>
+            </a:p>
+          </p:txBody>
+        </p:sp>
+        <p:sp>
+          <p:nvSpPr>
+            <p:cNvPr id="113" name="TextBox 112">
+              <a:extLst>
+                <a:ext uri="{FF2B5EF4-FFF2-40B4-BE49-F238E27FC236}">
+                  <a16:creationId xmlns:a16="http://schemas.microsoft.com/office/drawing/2014/main" id="{20179043-4531-4318-ADDA-3275527A9200}"/>
+                </a:ext>
+              </a:extLst>
+            </p:cNvPr>
+            <p:cNvSpPr txBox="1"/>
+            <p:nvPr/>
+          </p:nvSpPr>
+          <p:spPr>
+            <a:xfrm>
+              <a:off x="7447096" y="1918617"/>
+              <a:ext cx="708648" cy="648000"/>
+            </a:xfrm>
+            <a:prstGeom prst="rect">
+              <a:avLst/>
+            </a:prstGeom>
+            <a:noFill/>
+          </p:spPr>
+          <p:txBody>
+            <a:bodyPr wrap="square" rtlCol="0" anchor="ctr" anchorCtr="0">
+              <a:noAutofit/>
+            </a:bodyPr>
+            <a:lstStyle/>
+            <a:p>
+              <a:pPr algn="ctr"/>
+              <a:r>
+                <a:rPr lang="en-US" sz="1400" dirty="0"/>
+                <a:t>HTTPS</a:t>
+              </a:r>
+              <a:br>
+                <a:rPr lang="en-US" sz="1400" dirty="0"/>
+              </a:br>
+              <a:r>
+                <a:rPr lang="en-US" sz="1400" dirty="0"/>
+                <a:t>REST</a:t>
+              </a:r>
+            </a:p>
+          </p:txBody>
+        </p:sp>
+        <p:sp>
+          <p:nvSpPr>
+            <p:cNvPr id="31" name="TextBox 30">
+              <a:extLst>
+                <a:ext uri="{FF2B5EF4-FFF2-40B4-BE49-F238E27FC236}">
+                  <a16:creationId xmlns:a16="http://schemas.microsoft.com/office/drawing/2014/main" id="{60CAF32B-8BD7-45E8-8127-09B40ABC60CA}"/>
+                </a:ext>
+              </a:extLst>
+            </p:cNvPr>
+            <p:cNvSpPr txBox="1"/>
+            <p:nvPr/>
+          </p:nvSpPr>
+          <p:spPr>
+            <a:xfrm>
+              <a:off x="2755766" y="3664777"/>
+              <a:ext cx="1540476" cy="307777"/>
+            </a:xfrm>
+            <a:prstGeom prst="rect">
+              <a:avLst/>
+            </a:prstGeom>
             <a:solidFill>
-              <a:schemeClr val="tx1"/>
+              <a:schemeClr val="bg1">
+                <a:lumMod val="50000"/>
+              </a:schemeClr>
             </a:solidFill>
-            <a:tailEnd type="triangle" w="lg" len="lg"/>
-          </a:ln>
-        </p:spPr>
-        <p:style>
-          <a:lnRef idx="1">
-            <a:schemeClr val="accent1"/>
-          </a:lnRef>
-          <a:fillRef idx="0">
-            <a:schemeClr val="accent1"/>
-          </a:fillRef>
-          <a:effectRef idx="0">
-            <a:schemeClr val="accent1"/>
-          </a:effectRef>
-          <a:fontRef idx="minor">
-            <a:schemeClr val="tx1"/>
-          </a:fontRef>
-        </p:style>
-      </p:cxnSp>
-      <p:cxnSp>
-        <p:nvCxnSpPr>
-          <p:cNvPr id="94" name="Straight Arrow Connector 93">
-            <a:extLst>
-              <a:ext uri="{FF2B5EF4-FFF2-40B4-BE49-F238E27FC236}">
-                <a16:creationId xmlns:a16="http://schemas.microsoft.com/office/drawing/2014/main" id="{417F4992-2F28-4F19-9DFE-4279FB08EAE1}"/>
-              </a:ext>
-            </a:extLst>
-          </p:cNvPr>
-          <p:cNvCxnSpPr>
-            <a:cxnSpLocks/>
-          </p:cNvCxnSpPr>
-          <p:nvPr/>
-        </p:nvCxnSpPr>
-        <p:spPr>
-          <a:xfrm>
-            <a:off x="10336169" y="1634567"/>
-            <a:ext cx="396000" cy="0"/>
-          </a:xfrm>
-          <a:prstGeom prst="straightConnector1">
-            <a:avLst/>
-          </a:prstGeom>
-          <a:ln>
+            <a:ln>
+              <a:solidFill>
+                <a:schemeClr val="tx1"/>
+              </a:solidFill>
+            </a:ln>
+          </p:spPr>
+          <p:txBody>
+            <a:bodyPr wrap="square" rtlCol="0">
+              <a:spAutoFit/>
+            </a:bodyPr>
+            <a:lstStyle/>
+            <a:p>
+              <a:pPr algn="ctr"/>
+              <a:r>
+                <a:rPr lang="en-US" sz="1400" dirty="0">
+                  <a:solidFill>
+                    <a:schemeClr val="bg1"/>
+                  </a:solidFill>
+                </a:rPr>
+                <a:t>CTK extension</a:t>
+              </a:r>
+            </a:p>
+          </p:txBody>
+        </p:sp>
+        <p:sp>
+          <p:nvSpPr>
+            <p:cNvPr id="32" name="TextBox 31">
+              <a:extLst>
+                <a:ext uri="{FF2B5EF4-FFF2-40B4-BE49-F238E27FC236}">
+                  <a16:creationId xmlns:a16="http://schemas.microsoft.com/office/drawing/2014/main" id="{0BD78ECC-1524-4689-902C-9380403FDD7F}"/>
+                </a:ext>
+              </a:extLst>
+            </p:cNvPr>
+            <p:cNvSpPr txBox="1"/>
+            <p:nvPr/>
+          </p:nvSpPr>
+          <p:spPr>
+            <a:xfrm>
+              <a:off x="4875147" y="3667467"/>
+              <a:ext cx="2108886" cy="307777"/>
+            </a:xfrm>
+            <a:prstGeom prst="rect">
+              <a:avLst/>
+            </a:prstGeom>
             <a:solidFill>
-              <a:schemeClr val="tx1"/>
+              <a:srgbClr val="00B0F0"/>
             </a:solidFill>
-            <a:tailEnd type="triangle" w="lg" len="lg"/>
-          </a:ln>
-        </p:spPr>
-        <p:style>
-          <a:lnRef idx="1">
-            <a:schemeClr val="accent1"/>
-          </a:lnRef>
-          <a:fillRef idx="0">
-            <a:schemeClr val="accent1"/>
-          </a:fillRef>
-          <a:effectRef idx="0">
-            <a:schemeClr val="accent1"/>
-          </a:effectRef>
-          <a:fontRef idx="minor">
-            <a:schemeClr val="tx1"/>
-          </a:fontRef>
-        </p:style>
-      </p:cxnSp>
-      <p:cxnSp>
-        <p:nvCxnSpPr>
-          <p:cNvPr id="95" name="Straight Arrow Connector 94">
-            <a:extLst>
-              <a:ext uri="{FF2B5EF4-FFF2-40B4-BE49-F238E27FC236}">
-                <a16:creationId xmlns:a16="http://schemas.microsoft.com/office/drawing/2014/main" id="{D0349D8A-15B6-496F-9BE8-382A94F217C2}"/>
-              </a:ext>
-            </a:extLst>
-          </p:cNvPr>
-          <p:cNvCxnSpPr>
-            <a:cxnSpLocks/>
-          </p:cNvCxnSpPr>
-          <p:nvPr/>
-        </p:nvCxnSpPr>
-        <p:spPr>
-          <a:xfrm flipH="1">
-            <a:off x="2334690" y="1905861"/>
-            <a:ext cx="309563" cy="0"/>
-          </a:xfrm>
-          <a:prstGeom prst="straightConnector1">
-            <a:avLst/>
-          </a:prstGeom>
-          <a:ln>
+            <a:ln>
+              <a:solidFill>
+                <a:schemeClr val="tx1"/>
+              </a:solidFill>
+            </a:ln>
+          </p:spPr>
+          <p:txBody>
+            <a:bodyPr wrap="square" rtlCol="0">
+              <a:spAutoFit/>
+            </a:bodyPr>
+            <a:lstStyle/>
+            <a:p>
+              <a:pPr algn="ctr"/>
+              <a:r>
+                <a:rPr lang="en-US" sz="1400" dirty="0">
+                  <a:solidFill>
+                    <a:schemeClr val="bg1"/>
+                  </a:solidFill>
+                </a:rPr>
+                <a:t>SignPath CTK</a:t>
+              </a:r>
+            </a:p>
+          </p:txBody>
+        </p:sp>
+        <p:sp>
+          <p:nvSpPr>
+            <p:cNvPr id="33" name="TextBox 32">
+              <a:extLst>
+                <a:ext uri="{FF2B5EF4-FFF2-40B4-BE49-F238E27FC236}">
+                  <a16:creationId xmlns:a16="http://schemas.microsoft.com/office/drawing/2014/main" id="{679A5EEE-A68B-4097-B3F0-AA733B581BAB}"/>
+                </a:ext>
+              </a:extLst>
+            </p:cNvPr>
+            <p:cNvSpPr txBox="1"/>
+            <p:nvPr/>
+          </p:nvSpPr>
+          <p:spPr>
+            <a:xfrm>
+              <a:off x="606392" y="3424670"/>
+              <a:ext cx="1622767" cy="307777"/>
+            </a:xfrm>
+            <a:prstGeom prst="rect">
+              <a:avLst/>
+            </a:prstGeom>
             <a:solidFill>
-              <a:schemeClr val="tx1"/>
+              <a:schemeClr val="bg1">
+                <a:lumMod val="50000"/>
+              </a:schemeClr>
             </a:solidFill>
-            <a:tailEnd type="triangle" w="lg" len="lg"/>
-          </a:ln>
-        </p:spPr>
-        <p:style>
-          <a:lnRef idx="1">
-            <a:schemeClr val="accent1"/>
-          </a:lnRef>
-          <a:fillRef idx="0">
-            <a:schemeClr val="accent1"/>
-          </a:fillRef>
-          <a:effectRef idx="0">
-            <a:schemeClr val="accent1"/>
-          </a:effectRef>
-          <a:fontRef idx="minor">
-            <a:schemeClr val="tx1"/>
-          </a:fontRef>
-        </p:style>
-      </p:cxnSp>
-      <p:cxnSp>
-        <p:nvCxnSpPr>
-          <p:cNvPr id="96" name="Straight Arrow Connector 95">
-            <a:extLst>
-              <a:ext uri="{FF2B5EF4-FFF2-40B4-BE49-F238E27FC236}">
-                <a16:creationId xmlns:a16="http://schemas.microsoft.com/office/drawing/2014/main" id="{034997D4-BB4F-42A6-9E9F-509C5337AEBE}"/>
-              </a:ext>
-            </a:extLst>
-          </p:cNvPr>
-          <p:cNvCxnSpPr>
-            <a:cxnSpLocks/>
-          </p:cNvCxnSpPr>
-          <p:nvPr/>
-        </p:nvCxnSpPr>
-        <p:spPr>
-          <a:xfrm flipH="1">
-            <a:off x="4412084" y="1905861"/>
-            <a:ext cx="309563" cy="0"/>
-          </a:xfrm>
-          <a:prstGeom prst="straightConnector1">
-            <a:avLst/>
-          </a:prstGeom>
-          <a:ln>
-            <a:solidFill>
-              <a:schemeClr val="tx1"/>
-            </a:solidFill>
-            <a:tailEnd type="triangle" w="lg" len="lg"/>
-          </a:ln>
-        </p:spPr>
-        <p:style>
-          <a:lnRef idx="1">
-            <a:schemeClr val="accent1"/>
-          </a:lnRef>
-          <a:fillRef idx="0">
-            <a:schemeClr val="accent1"/>
-          </a:fillRef>
-          <a:effectRef idx="0">
-            <a:schemeClr val="accent1"/>
-          </a:effectRef>
-          <a:fontRef idx="minor">
-            <a:schemeClr val="tx1"/>
-          </a:fontRef>
-        </p:style>
-      </p:cxnSp>
-      <p:cxnSp>
-        <p:nvCxnSpPr>
-          <p:cNvPr id="97" name="Straight Arrow Connector 96">
-            <a:extLst>
-              <a:ext uri="{FF2B5EF4-FFF2-40B4-BE49-F238E27FC236}">
-                <a16:creationId xmlns:a16="http://schemas.microsoft.com/office/drawing/2014/main" id="{58C725FC-ADA8-4CDF-8FA4-6D2FEDB1EFC9}"/>
-              </a:ext>
-            </a:extLst>
-          </p:cNvPr>
-          <p:cNvCxnSpPr>
-            <a:cxnSpLocks/>
-          </p:cNvCxnSpPr>
-          <p:nvPr/>
-        </p:nvCxnSpPr>
-        <p:spPr>
-          <a:xfrm flipH="1">
-            <a:off x="7137533" y="1904075"/>
-            <a:ext cx="1018210" cy="0"/>
-          </a:xfrm>
-          <a:prstGeom prst="straightConnector1">
-            <a:avLst/>
-          </a:prstGeom>
-          <a:ln>
-            <a:solidFill>
-              <a:schemeClr val="tx1"/>
-            </a:solidFill>
-            <a:tailEnd type="triangle" w="lg" len="lg"/>
-          </a:ln>
-        </p:spPr>
-        <p:style>
-          <a:lnRef idx="1">
-            <a:schemeClr val="accent1"/>
-          </a:lnRef>
-          <a:fillRef idx="0">
-            <a:schemeClr val="accent1"/>
-          </a:fillRef>
-          <a:effectRef idx="0">
-            <a:schemeClr val="accent1"/>
-          </a:effectRef>
-          <a:fontRef idx="minor">
-            <a:schemeClr val="tx1"/>
-          </a:fontRef>
-        </p:style>
-      </p:cxnSp>
-      <p:cxnSp>
-        <p:nvCxnSpPr>
-          <p:cNvPr id="98" name="Straight Arrow Connector 97">
-            <a:extLst>
-              <a:ext uri="{FF2B5EF4-FFF2-40B4-BE49-F238E27FC236}">
-                <a16:creationId xmlns:a16="http://schemas.microsoft.com/office/drawing/2014/main" id="{21F2869C-A86B-4921-B99D-7A10BB562A7A}"/>
-              </a:ext>
-            </a:extLst>
-          </p:cNvPr>
-          <p:cNvCxnSpPr>
-            <a:cxnSpLocks/>
-          </p:cNvCxnSpPr>
-          <p:nvPr/>
-        </p:nvCxnSpPr>
-        <p:spPr>
-          <a:xfrm flipH="1">
-            <a:off x="10336169" y="1904075"/>
-            <a:ext cx="396000" cy="0"/>
-          </a:xfrm>
-          <a:prstGeom prst="straightConnector1">
-            <a:avLst/>
-          </a:prstGeom>
-          <a:ln>
-            <a:solidFill>
-              <a:schemeClr val="tx1"/>
-            </a:solidFill>
-            <a:tailEnd type="triangle" w="lg" len="lg"/>
-          </a:ln>
-        </p:spPr>
-        <p:style>
-          <a:lnRef idx="1">
-            <a:schemeClr val="accent1"/>
-          </a:lnRef>
-          <a:fillRef idx="0">
-            <a:schemeClr val="accent1"/>
-          </a:fillRef>
-          <a:effectRef idx="0">
-            <a:schemeClr val="accent1"/>
-          </a:effectRef>
-          <a:fontRef idx="minor">
-            <a:schemeClr val="tx1"/>
-          </a:fontRef>
-        </p:style>
-      </p:cxnSp>
-      <p:sp>
-        <p:nvSpPr>
-          <p:cNvPr id="99" name="TextBox 98">
-            <a:extLst>
-              <a:ext uri="{FF2B5EF4-FFF2-40B4-BE49-F238E27FC236}">
-                <a16:creationId xmlns:a16="http://schemas.microsoft.com/office/drawing/2014/main" id="{438D4C43-382A-4E70-BD37-6AADB465C5E5}"/>
-              </a:ext>
-            </a:extLst>
-          </p:cNvPr>
-          <p:cNvSpPr txBox="1"/>
-          <p:nvPr/>
-        </p:nvSpPr>
-        <p:spPr>
-          <a:xfrm>
-            <a:off x="487600" y="1449901"/>
-            <a:ext cx="1847089" cy="307777"/>
-          </a:xfrm>
-          <a:prstGeom prst="rect">
-            <a:avLst/>
-          </a:prstGeom>
-          <a:noFill/>
-        </p:spPr>
-        <p:txBody>
-          <a:bodyPr wrap="square" rtlCol="0">
-            <a:spAutoFit/>
-          </a:bodyPr>
-          <a:lstStyle/>
-          <a:p>
-            <a:pPr algn="ctr"/>
-            <a:r>
-              <a:rPr lang="en-US" sz="1400" dirty="0"/>
-              <a:t>calculate hash digest</a:t>
-            </a:r>
-          </a:p>
-        </p:txBody>
-      </p:sp>
-      <p:sp>
-        <p:nvSpPr>
-          <p:cNvPr id="100" name="TextBox 99">
-            <a:extLst>
-              <a:ext uri="{FF2B5EF4-FFF2-40B4-BE49-F238E27FC236}">
-                <a16:creationId xmlns:a16="http://schemas.microsoft.com/office/drawing/2014/main" id="{F9B2C732-0831-45B6-B0F3-F20C137C84DE}"/>
-              </a:ext>
-            </a:extLst>
-          </p:cNvPr>
-          <p:cNvSpPr txBox="1"/>
-          <p:nvPr/>
-        </p:nvSpPr>
-        <p:spPr>
-          <a:xfrm>
-            <a:off x="2632833" y="1449901"/>
-            <a:ext cx="1764730" cy="648000"/>
-          </a:xfrm>
-          <a:prstGeom prst="rect">
-            <a:avLst/>
-          </a:prstGeom>
-          <a:noFill/>
-        </p:spPr>
-        <p:txBody>
-          <a:bodyPr wrap="square" rtlCol="0" anchor="ctr" anchorCtr="0">
-            <a:noAutofit/>
-          </a:bodyPr>
-          <a:lstStyle/>
-          <a:p>
-            <a:pPr algn="ctr"/>
-            <a:r>
-              <a:rPr lang="en-US" sz="1400"/>
-              <a:t>call crypto provider</a:t>
-            </a:r>
-          </a:p>
-        </p:txBody>
-      </p:sp>
-      <p:sp>
-        <p:nvSpPr>
-          <p:cNvPr id="101" name="TextBox 100">
-            <a:extLst>
-              <a:ext uri="{FF2B5EF4-FFF2-40B4-BE49-F238E27FC236}">
-                <a16:creationId xmlns:a16="http://schemas.microsoft.com/office/drawing/2014/main" id="{5C392BD6-51DF-43FE-8456-92B9FF8239AC}"/>
-              </a:ext>
-            </a:extLst>
-          </p:cNvPr>
-          <p:cNvSpPr txBox="1"/>
-          <p:nvPr/>
-        </p:nvSpPr>
-        <p:spPr>
-          <a:xfrm>
-            <a:off x="4734561" y="1449901"/>
-            <a:ext cx="2415886" cy="648000"/>
-          </a:xfrm>
-          <a:prstGeom prst="rect">
-            <a:avLst/>
-          </a:prstGeom>
-          <a:noFill/>
-        </p:spPr>
-        <p:txBody>
-          <a:bodyPr wrap="square" rtlCol="0" anchor="ctr" anchorCtr="0">
-            <a:noAutofit/>
-          </a:bodyPr>
-          <a:lstStyle/>
-          <a:p>
-            <a:pPr algn="ctr"/>
-            <a:r>
-              <a:rPr lang="en-US" sz="1400" dirty="0"/>
-              <a:t>call SignPath with credentials, project, signing policy</a:t>
-            </a:r>
-          </a:p>
-        </p:txBody>
-      </p:sp>
-      <p:sp>
-        <p:nvSpPr>
-          <p:cNvPr id="102" name="TextBox 101">
-            <a:extLst>
-              <a:ext uri="{FF2B5EF4-FFF2-40B4-BE49-F238E27FC236}">
-                <a16:creationId xmlns:a16="http://schemas.microsoft.com/office/drawing/2014/main" id="{95B093E8-AB5C-4E50-B6DE-5199A762C8A4}"/>
-              </a:ext>
-            </a:extLst>
-          </p:cNvPr>
-          <p:cNvSpPr txBox="1"/>
-          <p:nvPr/>
-        </p:nvSpPr>
-        <p:spPr>
-          <a:xfrm>
-            <a:off x="8155743" y="1323809"/>
-            <a:ext cx="2180426" cy="918808"/>
-          </a:xfrm>
-          <a:prstGeom prst="rect">
-            <a:avLst/>
-          </a:prstGeom>
-          <a:noFill/>
-        </p:spPr>
-        <p:txBody>
-          <a:bodyPr wrap="square" rtlCol="0" anchor="ctr" anchorCtr="0">
-            <a:noAutofit/>
-          </a:bodyPr>
-          <a:lstStyle/>
-          <a:p>
-            <a:pPr marL="182563" indent="-182563">
-              <a:buFont typeface="Arial" panose="020B0604020202020204" pitchFamily="34" charset="0"/>
-              <a:buChar char="•"/>
-            </a:pPr>
-            <a:r>
-              <a:rPr lang="en-US" sz="1400" dirty="0">
-                <a:solidFill>
-                  <a:schemeClr val="bg1"/>
-                </a:solidFill>
-              </a:rPr>
-              <a:t>verify permissions</a:t>
-            </a:r>
-          </a:p>
-          <a:p>
-            <a:pPr marL="182563" indent="-182563">
-              <a:buFont typeface="Arial" panose="020B0604020202020204" pitchFamily="34" charset="0"/>
-              <a:buChar char="•"/>
-            </a:pPr>
-            <a:r>
-              <a:rPr lang="en-US" sz="1400" dirty="0">
-                <a:solidFill>
-                  <a:schemeClr val="bg1"/>
-                </a:solidFill>
-              </a:rPr>
-              <a:t>select key/certificate</a:t>
-            </a:r>
-          </a:p>
-          <a:p>
-            <a:pPr marL="182563" indent="-182563">
-              <a:buFont typeface="Arial" panose="020B0604020202020204" pitchFamily="34" charset="0"/>
-              <a:buChar char="•"/>
-            </a:pPr>
-            <a:r>
-              <a:rPr lang="en-US" sz="1400" dirty="0">
-                <a:solidFill>
-                  <a:schemeClr val="bg1"/>
-                </a:solidFill>
-              </a:rPr>
-              <a:t>call HSM</a:t>
-            </a:r>
-          </a:p>
-          <a:p>
-            <a:pPr marL="182563" indent="-182563">
-              <a:buFont typeface="Arial" panose="020B0604020202020204" pitchFamily="34" charset="0"/>
-              <a:buChar char="•"/>
-            </a:pPr>
-            <a:r>
-              <a:rPr lang="en-US" sz="1400" dirty="0">
-                <a:solidFill>
-                  <a:schemeClr val="bg1"/>
-                </a:solidFill>
-              </a:rPr>
-              <a:t>audit signing</a:t>
-            </a:r>
-          </a:p>
-        </p:txBody>
-      </p:sp>
-      <p:sp>
-        <p:nvSpPr>
-          <p:cNvPr id="103" name="TextBox 102">
-            <a:extLst>
-              <a:ext uri="{FF2B5EF4-FFF2-40B4-BE49-F238E27FC236}">
-                <a16:creationId xmlns:a16="http://schemas.microsoft.com/office/drawing/2014/main" id="{1236D719-568D-4A43-977B-8166647556F8}"/>
-              </a:ext>
-            </a:extLst>
-          </p:cNvPr>
-          <p:cNvSpPr txBox="1"/>
-          <p:nvPr/>
-        </p:nvSpPr>
-        <p:spPr>
-          <a:xfrm>
-            <a:off x="10732169" y="1459213"/>
-            <a:ext cx="1169773" cy="648000"/>
-          </a:xfrm>
-          <a:prstGeom prst="rect">
-            <a:avLst/>
-          </a:prstGeom>
-          <a:noFill/>
-        </p:spPr>
-        <p:txBody>
-          <a:bodyPr wrap="square" rtlCol="0" anchor="ctr" anchorCtr="0">
-            <a:noAutofit/>
-          </a:bodyPr>
-          <a:lstStyle/>
-          <a:p>
-            <a:pPr algn="ctr"/>
-            <a:r>
-              <a:rPr lang="en-US" sz="1400" dirty="0"/>
-              <a:t>sign hash digest</a:t>
-            </a:r>
-          </a:p>
-        </p:txBody>
-      </p:sp>
-      <p:sp>
-        <p:nvSpPr>
-          <p:cNvPr id="104" name="TextBox 103">
-            <a:extLst>
-              <a:ext uri="{FF2B5EF4-FFF2-40B4-BE49-F238E27FC236}">
-                <a16:creationId xmlns:a16="http://schemas.microsoft.com/office/drawing/2014/main" id="{1C69EE09-6994-4743-9755-6FD34A51A151}"/>
-              </a:ext>
-            </a:extLst>
-          </p:cNvPr>
-          <p:cNvSpPr txBox="1"/>
-          <p:nvPr/>
-        </p:nvSpPr>
-        <p:spPr>
-          <a:xfrm>
-            <a:off x="487600" y="1750186"/>
-            <a:ext cx="1847089" cy="307777"/>
-          </a:xfrm>
-          <a:prstGeom prst="rect">
-            <a:avLst/>
-          </a:prstGeom>
-          <a:noFill/>
-        </p:spPr>
-        <p:txBody>
-          <a:bodyPr wrap="square" rtlCol="0">
-            <a:spAutoFit/>
-          </a:bodyPr>
-          <a:lstStyle/>
-          <a:p>
-            <a:pPr algn="ctr"/>
-            <a:r>
-              <a:rPr lang="en-US" sz="1400"/>
-              <a:t>write signature to file</a:t>
-            </a:r>
-          </a:p>
-        </p:txBody>
-      </p:sp>
-      <p:sp>
-        <p:nvSpPr>
-          <p:cNvPr id="105" name="TextBox 104">
-            <a:extLst>
-              <a:ext uri="{FF2B5EF4-FFF2-40B4-BE49-F238E27FC236}">
-                <a16:creationId xmlns:a16="http://schemas.microsoft.com/office/drawing/2014/main" id="{0AAD993C-AD65-4CD8-A561-0F499478A568}"/>
-              </a:ext>
-            </a:extLst>
-          </p:cNvPr>
-          <p:cNvSpPr txBox="1"/>
-          <p:nvPr/>
-        </p:nvSpPr>
-        <p:spPr>
-          <a:xfrm>
-            <a:off x="606392" y="2442628"/>
-            <a:ext cx="1622767" cy="307777"/>
-          </a:xfrm>
-          <a:prstGeom prst="rect">
-            <a:avLst/>
-          </a:prstGeom>
-          <a:solidFill>
-            <a:schemeClr val="bg1">
-              <a:lumMod val="50000"/>
-            </a:schemeClr>
-          </a:solidFill>
-          <a:ln>
-            <a:solidFill>
-              <a:schemeClr val="tx1"/>
-            </a:solidFill>
-          </a:ln>
-        </p:spPr>
-        <p:txBody>
-          <a:bodyPr wrap="square" rtlCol="0">
-            <a:spAutoFit/>
-          </a:bodyPr>
-          <a:lstStyle/>
-          <a:p>
-            <a:pPr algn="ctr"/>
-            <a:r>
-              <a:rPr lang="en-US" sz="1400">
-                <a:solidFill>
-                  <a:schemeClr val="bg1"/>
-                </a:solidFill>
-              </a:rPr>
-              <a:t>OpenSSL</a:t>
-            </a:r>
-          </a:p>
-        </p:txBody>
-      </p:sp>
-      <p:sp>
-        <p:nvSpPr>
-          <p:cNvPr id="106" name="TextBox 105">
-            <a:extLst>
-              <a:ext uri="{FF2B5EF4-FFF2-40B4-BE49-F238E27FC236}">
-                <a16:creationId xmlns:a16="http://schemas.microsoft.com/office/drawing/2014/main" id="{D736A967-40DC-4011-BF8B-52256685C19C}"/>
-              </a:ext>
-            </a:extLst>
-          </p:cNvPr>
-          <p:cNvSpPr txBox="1"/>
-          <p:nvPr/>
-        </p:nvSpPr>
-        <p:spPr>
-          <a:xfrm>
-            <a:off x="2756380" y="2442626"/>
-            <a:ext cx="1540476" cy="307777"/>
-          </a:xfrm>
-          <a:prstGeom prst="rect">
-            <a:avLst/>
-          </a:prstGeom>
-          <a:solidFill>
-            <a:schemeClr val="bg1">
-              <a:lumMod val="50000"/>
-            </a:schemeClr>
-          </a:solidFill>
-          <a:ln>
-            <a:solidFill>
-              <a:schemeClr val="tx1"/>
-            </a:solidFill>
-          </a:ln>
-        </p:spPr>
-        <p:txBody>
-          <a:bodyPr wrap="square" rtlCol="0">
-            <a:spAutoFit/>
-          </a:bodyPr>
-          <a:lstStyle/>
-          <a:p>
-            <a:pPr algn="ctr"/>
-            <a:r>
-              <a:rPr lang="en-US" sz="1400" dirty="0">
-                <a:solidFill>
-                  <a:schemeClr val="bg1"/>
-                </a:solidFill>
-              </a:rPr>
-              <a:t>Cryptoki engine</a:t>
-            </a:r>
-          </a:p>
-        </p:txBody>
-      </p:sp>
-      <p:sp>
-        <p:nvSpPr>
-          <p:cNvPr id="107" name="TextBox 106">
-            <a:extLst>
-              <a:ext uri="{FF2B5EF4-FFF2-40B4-BE49-F238E27FC236}">
-                <a16:creationId xmlns:a16="http://schemas.microsoft.com/office/drawing/2014/main" id="{A22C1ABA-748A-4F57-9BE5-A826408343E1}"/>
-              </a:ext>
-            </a:extLst>
-          </p:cNvPr>
-          <p:cNvSpPr txBox="1"/>
-          <p:nvPr/>
-        </p:nvSpPr>
-        <p:spPr>
-          <a:xfrm>
-            <a:off x="4875147" y="2442627"/>
-            <a:ext cx="2108886" cy="307777"/>
-          </a:xfrm>
-          <a:prstGeom prst="rect">
-            <a:avLst/>
-          </a:prstGeom>
-          <a:solidFill>
-            <a:srgbClr val="00B0F0"/>
-          </a:solidFill>
-          <a:ln>
-            <a:solidFill>
-              <a:schemeClr val="tx1"/>
-            </a:solidFill>
-          </a:ln>
-        </p:spPr>
-        <p:txBody>
-          <a:bodyPr wrap="square" rtlCol="0">
-            <a:spAutoFit/>
-          </a:bodyPr>
-          <a:lstStyle/>
-          <a:p>
-            <a:pPr algn="ctr"/>
-            <a:r>
-              <a:rPr lang="en-US" sz="1400" dirty="0">
-                <a:solidFill>
-                  <a:schemeClr val="bg1"/>
-                </a:solidFill>
-              </a:rPr>
-              <a:t>SignPath Cryptoki library</a:t>
-            </a:r>
-          </a:p>
-        </p:txBody>
-      </p:sp>
-      <p:sp>
-        <p:nvSpPr>
-          <p:cNvPr id="108" name="TextBox 107">
-            <a:extLst>
-              <a:ext uri="{FF2B5EF4-FFF2-40B4-BE49-F238E27FC236}">
-                <a16:creationId xmlns:a16="http://schemas.microsoft.com/office/drawing/2014/main" id="{FC25D197-D620-4FB6-9E52-9E2F8096DE7E}"/>
-              </a:ext>
-            </a:extLst>
-          </p:cNvPr>
-          <p:cNvSpPr txBox="1"/>
-          <p:nvPr/>
-        </p:nvSpPr>
-        <p:spPr>
-          <a:xfrm>
-            <a:off x="606392" y="3064411"/>
-            <a:ext cx="1622767" cy="307777"/>
-          </a:xfrm>
-          <a:prstGeom prst="rect">
-            <a:avLst/>
-          </a:prstGeom>
-          <a:solidFill>
-            <a:schemeClr val="bg1">
-              <a:lumMod val="50000"/>
-            </a:schemeClr>
-          </a:solidFill>
-          <a:ln>
-            <a:solidFill>
-              <a:schemeClr val="tx1"/>
-            </a:solidFill>
-          </a:ln>
-        </p:spPr>
-        <p:txBody>
-          <a:bodyPr wrap="square" rtlCol="0">
-            <a:spAutoFit/>
-          </a:bodyPr>
-          <a:lstStyle/>
-          <a:p>
-            <a:pPr algn="ctr"/>
-            <a:r>
-              <a:rPr lang="en-US" sz="1400" dirty="0">
-                <a:solidFill>
-                  <a:schemeClr val="bg1"/>
-                </a:solidFill>
-              </a:rPr>
-              <a:t>SignTool.exe</a:t>
-            </a:r>
-          </a:p>
-        </p:txBody>
-      </p:sp>
-      <p:sp>
-        <p:nvSpPr>
-          <p:cNvPr id="109" name="TextBox 108">
-            <a:extLst>
-              <a:ext uri="{FF2B5EF4-FFF2-40B4-BE49-F238E27FC236}">
-                <a16:creationId xmlns:a16="http://schemas.microsoft.com/office/drawing/2014/main" id="{1DB52A4F-345D-4F69-AD7A-6178390C7D85}"/>
-              </a:ext>
-            </a:extLst>
-          </p:cNvPr>
-          <p:cNvSpPr txBox="1"/>
-          <p:nvPr/>
-        </p:nvSpPr>
-        <p:spPr>
-          <a:xfrm>
-            <a:off x="2756380" y="3261402"/>
-            <a:ext cx="1540476" cy="307777"/>
-          </a:xfrm>
-          <a:prstGeom prst="rect">
-            <a:avLst/>
-          </a:prstGeom>
-          <a:solidFill>
-            <a:schemeClr val="bg1">
-              <a:lumMod val="50000"/>
-            </a:schemeClr>
-          </a:solidFill>
-          <a:ln>
-            <a:solidFill>
-              <a:schemeClr val="tx1"/>
-            </a:solidFill>
-          </a:ln>
-        </p:spPr>
-        <p:txBody>
-          <a:bodyPr wrap="square" rtlCol="0">
-            <a:spAutoFit/>
-          </a:bodyPr>
-          <a:lstStyle/>
-          <a:p>
-            <a:pPr algn="ctr"/>
-            <a:r>
-              <a:rPr lang="en-US" sz="1400">
-                <a:solidFill>
-                  <a:schemeClr val="bg1"/>
-                </a:solidFill>
-              </a:rPr>
-              <a:t>CNG</a:t>
-            </a:r>
-          </a:p>
-        </p:txBody>
-      </p:sp>
-      <p:sp>
-        <p:nvSpPr>
-          <p:cNvPr id="110" name="TextBox 109">
-            <a:extLst>
-              <a:ext uri="{FF2B5EF4-FFF2-40B4-BE49-F238E27FC236}">
-                <a16:creationId xmlns:a16="http://schemas.microsoft.com/office/drawing/2014/main" id="{B0325DE6-B480-4280-978D-5A3568F7F823}"/>
-              </a:ext>
-            </a:extLst>
-          </p:cNvPr>
-          <p:cNvSpPr txBox="1"/>
-          <p:nvPr/>
-        </p:nvSpPr>
-        <p:spPr>
-          <a:xfrm>
-            <a:off x="4875147" y="3261403"/>
-            <a:ext cx="2108886" cy="307777"/>
-          </a:xfrm>
-          <a:prstGeom prst="rect">
-            <a:avLst/>
-          </a:prstGeom>
-          <a:solidFill>
-            <a:srgbClr val="00B0F0"/>
-          </a:solidFill>
-          <a:ln>
-            <a:solidFill>
-              <a:schemeClr val="tx1"/>
-            </a:solidFill>
-          </a:ln>
-        </p:spPr>
-        <p:txBody>
-          <a:bodyPr wrap="square" rtlCol="0">
-            <a:spAutoFit/>
-          </a:bodyPr>
-          <a:lstStyle/>
-          <a:p>
-            <a:pPr algn="ctr"/>
-            <a:r>
-              <a:rPr lang="en-US" sz="1400">
-                <a:solidFill>
-                  <a:schemeClr val="bg1"/>
-                </a:solidFill>
-              </a:rPr>
-              <a:t>SignPath KSP</a:t>
-            </a:r>
-          </a:p>
-        </p:txBody>
-      </p:sp>
-      <p:sp>
-        <p:nvSpPr>
-          <p:cNvPr id="111" name="TextBox 110">
-            <a:extLst>
-              <a:ext uri="{FF2B5EF4-FFF2-40B4-BE49-F238E27FC236}">
-                <a16:creationId xmlns:a16="http://schemas.microsoft.com/office/drawing/2014/main" id="{86F76335-CDF4-4364-9006-2A8258C548E7}"/>
-              </a:ext>
-            </a:extLst>
-          </p:cNvPr>
-          <p:cNvSpPr txBox="1"/>
-          <p:nvPr/>
-        </p:nvSpPr>
-        <p:spPr>
-          <a:xfrm>
-            <a:off x="2756380" y="2852014"/>
-            <a:ext cx="1540476" cy="307777"/>
-          </a:xfrm>
-          <a:prstGeom prst="rect">
-            <a:avLst/>
-          </a:prstGeom>
-          <a:solidFill>
-            <a:schemeClr val="bg1">
-              <a:lumMod val="50000"/>
-            </a:schemeClr>
-          </a:solidFill>
-          <a:ln>
-            <a:solidFill>
-              <a:schemeClr val="tx1"/>
-            </a:solidFill>
-          </a:ln>
-        </p:spPr>
-        <p:txBody>
-          <a:bodyPr wrap="square" rtlCol="0">
-            <a:spAutoFit/>
-          </a:bodyPr>
-          <a:lstStyle/>
-          <a:p>
-            <a:pPr algn="ctr"/>
-            <a:r>
-              <a:rPr lang="en-US" sz="1400">
-                <a:solidFill>
-                  <a:schemeClr val="bg1"/>
-                </a:solidFill>
-              </a:rPr>
-              <a:t>CAPI</a:t>
-            </a:r>
-          </a:p>
-        </p:txBody>
-      </p:sp>
-      <p:sp>
-        <p:nvSpPr>
-          <p:cNvPr id="112" name="TextBox 111">
-            <a:extLst>
-              <a:ext uri="{FF2B5EF4-FFF2-40B4-BE49-F238E27FC236}">
-                <a16:creationId xmlns:a16="http://schemas.microsoft.com/office/drawing/2014/main" id="{7E08DA84-26F3-4560-9326-18989FD222EC}"/>
-              </a:ext>
-            </a:extLst>
-          </p:cNvPr>
-          <p:cNvSpPr txBox="1"/>
-          <p:nvPr/>
-        </p:nvSpPr>
-        <p:spPr>
-          <a:xfrm>
-            <a:off x="4875147" y="2847728"/>
-            <a:ext cx="2108886" cy="307777"/>
-          </a:xfrm>
-          <a:prstGeom prst="rect">
-            <a:avLst/>
-          </a:prstGeom>
-          <a:solidFill>
-            <a:srgbClr val="00B0F0"/>
-          </a:solidFill>
-          <a:ln>
-            <a:solidFill>
-              <a:schemeClr val="tx1"/>
-            </a:solidFill>
-          </a:ln>
-        </p:spPr>
-        <p:txBody>
-          <a:bodyPr wrap="square" rtlCol="0">
-            <a:spAutoFit/>
-          </a:bodyPr>
-          <a:lstStyle/>
-          <a:p>
-            <a:pPr algn="ctr"/>
-            <a:r>
-              <a:rPr lang="en-US" sz="1400">
-                <a:solidFill>
-                  <a:schemeClr val="bg1"/>
-                </a:solidFill>
-              </a:rPr>
-              <a:t>SignPath CSP</a:t>
-            </a:r>
-          </a:p>
-        </p:txBody>
-      </p:sp>
-      <p:sp>
-        <p:nvSpPr>
-          <p:cNvPr id="113" name="TextBox 112">
-            <a:extLst>
-              <a:ext uri="{FF2B5EF4-FFF2-40B4-BE49-F238E27FC236}">
-                <a16:creationId xmlns:a16="http://schemas.microsoft.com/office/drawing/2014/main" id="{20179043-4531-4318-ADDA-3275527A9200}"/>
-              </a:ext>
-            </a:extLst>
-          </p:cNvPr>
-          <p:cNvSpPr txBox="1"/>
-          <p:nvPr/>
-        </p:nvSpPr>
-        <p:spPr>
-          <a:xfrm>
-            <a:off x="7447096" y="1918617"/>
-            <a:ext cx="708648" cy="648000"/>
-          </a:xfrm>
-          <a:prstGeom prst="rect">
-            <a:avLst/>
-          </a:prstGeom>
-          <a:noFill/>
-        </p:spPr>
-        <p:txBody>
-          <a:bodyPr wrap="square" rtlCol="0" anchor="ctr" anchorCtr="0">
-            <a:noAutofit/>
-          </a:bodyPr>
-          <a:lstStyle/>
-          <a:p>
-            <a:pPr algn="ctr"/>
-            <a:r>
-              <a:rPr lang="en-US" sz="1400" dirty="0"/>
-              <a:t>HTTPS</a:t>
-            </a:r>
-            <a:br>
-              <a:rPr lang="en-US" sz="1400" dirty="0"/>
-            </a:br>
-            <a:r>
-              <a:rPr lang="en-US" sz="1400" dirty="0"/>
-              <a:t>REST</a:t>
-            </a:r>
-          </a:p>
-        </p:txBody>
-      </p:sp>
+            <a:ln>
+              <a:solidFill>
+                <a:schemeClr val="tx1"/>
+              </a:solidFill>
+            </a:ln>
+          </p:spPr>
+          <p:txBody>
+            <a:bodyPr wrap="square" rtlCol="0">
+              <a:spAutoFit/>
+            </a:bodyPr>
+            <a:lstStyle/>
+            <a:p>
+              <a:pPr algn="ctr"/>
+              <a:r>
+                <a:rPr lang="en-US" sz="1400" dirty="0">
+                  <a:solidFill>
+                    <a:schemeClr val="bg1"/>
+                  </a:solidFill>
+                </a:rPr>
+                <a:t>codesign</a:t>
+              </a:r>
+            </a:p>
+          </p:txBody>
+        </p:sp>
+      </p:grpSp>
     </p:spTree>
     <p:extLst>
       <p:ext uri="{BB962C8B-B14F-4D97-AF65-F5344CB8AC3E}">

</xml_diff>